<commit_message>
Update JP User manual [#14399999] 	modified:   docs/Brainliner_Desktop_Tutorial_for_Use.odp 	modified:   docs/Brainliner_Desktop_Tutorial_for_Use.pdf 	modified:   docs/Brainliner_Desktop_Tutorial_for_Use.pptx
</commit_message>
<xml_diff>
--- a/docs/Brainliner_Desktop_Tutorial_for_Use.pptx
+++ b/docs/Brainliner_Desktop_Tutorial_for_Use.pptx
@@ -29,6 +29,7 @@
     <p:sldId id="277" r:id="rId24"/>
     <p:sldId id="278" r:id="rId25"/>
     <p:sldId id="279" r:id="rId26"/>
+    <p:sldId id="280" r:id="rId27"/>
   </p:sldIdLst>
   <p:sldSz cx="10080625" cy="7559675"/>
   <p:notesSz cx="7559675" cy="10691812"/>
@@ -394,7 +395,7 @@
           <a:bodyPr bIns="0" lIns="0" rIns="0" tIns="0" wrap="none"/>
           <a:p>
             <a:pPr algn="r"/>
-            <a:fld id="{7151C1A1-3131-4121-A1C1-21F141F19111}" type="slidenum">
+            <a:fld id="{41E16151-4101-4121-81F1-1151F1910101}" type="slidenum">
               <a:rPr lang="fi-FI" sz="1400"/>
               <a:t>&lt;番号&gt;</a:t>
             </a:fld>
@@ -479,7 +480,7 @@
             <a:pPr algn="ctr"/>
             <a:r>
               <a:rPr lang="fi-FI" sz="1600"/>
-              <a:t>2011/08/11 K.Harada v0.9</a:t>
+              <a:t>2011/08/30 K.Harada v0.9</a:t>
             </a:r>
             <a:r>
               <a:rPr lang="fi-FI" sz="1600"/>
@@ -1441,6 +1442,62 @@
             </a:r>
             <a:endParaRPr/>
           </a:p>
+          <a:p>
+            <a:pPr lvl="2">
+              <a:buSzPct val="45000"/>
+              <a:buFont typeface="StarSymbol"/>
+              <a:buChar char=""/>
+            </a:pPr>
+            <a:r>
+              <a:rPr lang="fi-FI" sz="1400">
+                <a:solidFill>
+                  <a:srgbClr val="000000"/>
+                </a:solidFill>
+              </a:rPr>
+              <a:t>Memory</a:t>
+            </a:r>
+            <a:r>
+              <a:rPr lang="fi-FI" sz="1400">
+                <a:solidFill>
+                  <a:srgbClr val="000000"/>
+                </a:solidFill>
+              </a:rPr>
+              <a:t>：</a:t>
+            </a:r>
+            <a:r>
+              <a:rPr lang="fi-FI" sz="1400">
+                <a:solidFill>
+                  <a:srgbClr val="000000"/>
+                </a:solidFill>
+              </a:rPr>
+              <a:t>6GB</a:t>
+            </a:r>
+            <a:r>
+              <a:rPr lang="fi-FI" sz="1400">
+                <a:solidFill>
+                  <a:srgbClr val="000000"/>
+                </a:solidFill>
+              </a:rPr>
+              <a:t>以上</a:t>
+            </a:r>
+            <a:endParaRPr/>
+          </a:p>
+          <a:p>
+            <a:pPr lvl="2">
+              <a:buSzPct val="45000"/>
+              <a:buFont typeface="StarSymbol"/>
+              <a:buChar char=""/>
+            </a:pPr>
+            <a:r>
+              <a:rPr lang="fi-FI" sz="1400">
+                <a:solidFill>
+                  <a:srgbClr val="000000"/>
+                </a:solidFill>
+              </a:rPr>
+              <a:t>Software : Java 1.6.x</a:t>
+            </a:r>
+            <a:endParaRPr/>
+          </a:p>
         </p:txBody>
       </p:sp>
     </p:spTree>
@@ -1501,7 +1558,7 @@
         <p:spPr>
           <a:xfrm>
             <a:off x="504000" y="1769040"/>
-            <a:ext cx="4426560" cy="5505120"/>
+            <a:ext cx="4426560" cy="4989600"/>
           </a:xfrm>
           <a:prstGeom prst="rect">
             <a:avLst/>
@@ -1648,82 +1705,7 @@
             </a:pPr>
             <a:r>
               <a:rPr lang="fi-FI" sz="1100"/>
-              <a:t>Delete</a:t>
-            </a:r>
-            <a:r>
-              <a:rPr lang="fi-FI" sz="1100"/>
-              <a:t>
-</a:t>
-            </a:r>
-            <a:r>
-              <a:rPr lang="fi-FI" sz="1100"/>
-              <a:t>ディレクトリまたはファイルを削除します。</a:t>
-            </a:r>
-            <a:endParaRPr/>
-          </a:p>
-          <a:p>
-            <a:pPr lvl="2">
-              <a:buSzPct val="45000"/>
-              <a:buFont typeface="StarSymbol"/>
-              <a:buChar char=""/>
-            </a:pPr>
-            <a:r>
-              <a:rPr lang="fi-FI" sz="1100"/>
-              <a:t>Convert To Neuroshare</a:t>
-            </a:r>
-            <a:r>
-              <a:rPr lang="fi-FI" sz="1100"/>
-              <a:t>
-</a:t>
-            </a:r>
-            <a:r>
-              <a:rPr lang="fi-FI" sz="1100"/>
-              <a:t>データファイルを</a:t>
-            </a:r>
-            <a:r>
-              <a:rPr lang="fi-FI" sz="1100"/>
-              <a:t>Neuroshare</a:t>
-            </a:r>
-            <a:r>
-              <a:rPr lang="fi-FI" sz="1100"/>
-              <a:t>形式に変換します。</a:t>
-            </a:r>
-            <a:endParaRPr/>
-          </a:p>
-          <a:p>
-            <a:pPr lvl="2">
-              <a:buSzPct val="45000"/>
-              <a:buFont typeface="StarSymbol"/>
-              <a:buChar char=""/>
-            </a:pPr>
-            <a:r>
-              <a:rPr lang="fi-FI" sz="1100"/>
-              <a:t>Copy To Workspace</a:t>
-            </a:r>
-            <a:r>
-              <a:rPr lang="fi-FI" sz="1100"/>
-              <a:t>
-</a:t>
-            </a:r>
-            <a:r>
-              <a:rPr lang="fi-FI" sz="1100"/>
-              <a:t>ファイルのコンテンツを</a:t>
-            </a:r>
-            <a:r>
-              <a:rPr lang="fi-FI" sz="1100"/>
-              <a:t>Workspace</a:t>
-            </a:r>
-            <a:r>
-              <a:rPr lang="fi-FI" sz="1100"/>
-              <a:t>にコピーします。</a:t>
-            </a:r>
-            <a:r>
-              <a:rPr lang="fi-FI" sz="1100">
-                <a:solidFill>
-                  <a:srgbClr val="ff420e"/>
-                </a:solidFill>
-              </a:rPr>
-              <a:t>※移動ではないため、元コンテンツは保持されます。</a:t>
+              <a:t>次ページに続く</a:t>
             </a:r>
             <a:endParaRPr/>
           </a:p>
@@ -1802,12 +1784,8 @@
               <a:buChar char=""/>
             </a:pPr>
             <a:r>
-              <a:rPr lang="fi-FI" sz="1400"/>
-              <a:t>Explorer – Properties</a:t>
-            </a:r>
-            <a:r>
-              <a:rPr lang="fi-FI" sz="1400"/>
-              <a:t>の連携</a:t>
+              <a:rPr lang="fi-FI" sz="1300"/>
+              <a:t>Explorer</a:t>
             </a:r>
             <a:endParaRPr/>
           </a:p>
@@ -1818,32 +1796,211 @@
               <a:buChar char=""/>
             </a:pPr>
             <a:r>
-              <a:rPr lang="fi-FI" sz="1400"/>
-              <a:t>Explorer</a:t>
-            </a:r>
-            <a:r>
-              <a:rPr lang="fi-FI" sz="1400"/>
-              <a:t>の選択は、</a:t>
-            </a:r>
-            <a:r>
-              <a:rPr lang="fi-FI" sz="1400"/>
-              <a:t>Properties</a:t>
-            </a:r>
-            <a:r>
-              <a:rPr lang="fi-FI" sz="1400"/>
-              <a:t>の表示に影響します。選択したファイルの情報を知りたい場合は</a:t>
-            </a:r>
-            <a:r>
-              <a:rPr lang="fi-FI" sz="1400"/>
-              <a:t>Properties</a:t>
-            </a:r>
-            <a:r>
-              <a:rPr lang="fi-FI" sz="1400"/>
-              <a:t>との併用が便利です。</a:t>
-            </a:r>
-            <a:endParaRPr/>
-          </a:p>
-          <a:p>
+              <a:rPr lang="fi-FI" sz="1300"/>
+              <a:t>ファイルまたはディレクトリを右クリックすると、下記ポップアップメニューが表示されます。</a:t>
+            </a:r>
+            <a:endParaRPr/>
+          </a:p>
+          <a:p>
+            <a:pPr lvl="2">
+              <a:buSzPct val="45000"/>
+              <a:buFont typeface="StarSymbol"/>
+              <a:buChar char=""/>
+            </a:pPr>
+            <a:r>
+              <a:rPr lang="fi-FI" sz="1100"/>
+              <a:t>Delete</a:t>
+            </a:r>
+            <a:r>
+              <a:rPr lang="fi-FI" sz="1100"/>
+              <a:t>
+</a:t>
+            </a:r>
+            <a:r>
+              <a:rPr lang="fi-FI" sz="1100"/>
+              <a:t>ディレクトリまたはファイルを削除します。</a:t>
+            </a:r>
+            <a:endParaRPr/>
+          </a:p>
+          <a:p>
+            <a:pPr lvl="2">
+              <a:buSzPct val="45000"/>
+              <a:buFont typeface="StarSymbol"/>
+              <a:buChar char=""/>
+            </a:pPr>
+            <a:r>
+              <a:rPr lang="fi-FI" sz="1100"/>
+              <a:t>Convert to Neuroshare</a:t>
+            </a:r>
+            <a:r>
+              <a:rPr lang="fi-FI" sz="1100"/>
+              <a:t>
+</a:t>
+            </a:r>
+            <a:r>
+              <a:rPr lang="fi-FI" sz="1100"/>
+              <a:t>データファイルを</a:t>
+            </a:r>
+            <a:r>
+              <a:rPr lang="fi-FI" sz="1100"/>
+              <a:t>Neuroshare</a:t>
+            </a:r>
+            <a:r>
+              <a:rPr lang="fi-FI" sz="1100"/>
+              <a:t>形式に変換します。</a:t>
+            </a:r>
+            <a:r>
+              <a:rPr lang="fi-FI" sz="1100"/>
+              <a:t>(*1)</a:t>
+            </a:r>
+            <a:endParaRPr/>
+          </a:p>
+          <a:p>
+            <a:pPr lvl="2">
+              <a:buSzPct val="45000"/>
+              <a:buFont typeface="StarSymbol"/>
+              <a:buChar char=""/>
+            </a:pPr>
+            <a:r>
+              <a:rPr lang="fi-FI" sz="1100"/>
+              <a:t>Copy to Workspace</a:t>
+            </a:r>
+            <a:r>
+              <a:rPr lang="fi-FI" sz="1100"/>
+              <a:t>
+</a:t>
+            </a:r>
+            <a:r>
+              <a:rPr lang="fi-FI" sz="1100"/>
+              <a:t>ファイルのコンテンツを</a:t>
+            </a:r>
+            <a:r>
+              <a:rPr lang="fi-FI" sz="1100"/>
+              <a:t>Workspace</a:t>
+            </a:r>
+            <a:r>
+              <a:rPr lang="fi-FI" sz="1100"/>
+              <a:t>にコピーします。</a:t>
+            </a:r>
+            <a:r>
+              <a:rPr lang="fi-FI" sz="1100"/>
+              <a:t>(*2)</a:t>
+            </a:r>
+            <a:endParaRPr/>
+          </a:p>
+        </p:txBody>
+      </p:sp>
+      <p:sp>
+        <p:nvSpPr>
+          <p:cNvPr id="58" name="TextShape 3"/>
+          <p:cNvSpPr txBox="1"/>
+          <p:nvPr/>
+        </p:nvSpPr>
+        <p:spPr>
+          <a:xfrm>
+            <a:off x="498600" y="6300000"/>
+            <a:ext cx="8681400" cy="1015560"/>
+          </a:xfrm>
+          <a:prstGeom prst="rect">
+            <a:avLst/>
+          </a:prstGeom>
+        </p:spPr>
+        <p:txBody>
+          <a:bodyPr bIns="0" lIns="0" rIns="0" tIns="0" wrap="none"/>
+          <a:p>
+            <a:pPr>
+              <a:buSzPct val="45000"/>
+              <a:buFont typeface="StarSymbol"/>
+              <a:buChar char=""/>
+            </a:pPr>
+            <a:r>
+              <a:rPr lang="fi-FI" sz="1400">
+                <a:solidFill>
+                  <a:srgbClr val="ff420e"/>
+                </a:solidFill>
+              </a:rPr>
+              <a:t>(*1) : Neuroshare</a:t>
+            </a:r>
+            <a:r>
+              <a:rPr lang="fi-FI" sz="1400">
+                <a:solidFill>
+                  <a:srgbClr val="ff420e"/>
+                </a:solidFill>
+              </a:rPr>
+              <a:t>フォーマットへ変換可能なデータフォーマットは、</a:t>
+            </a:r>
+            <a:r>
+              <a:rPr lang="fi-FI" sz="1400">
+                <a:solidFill>
+                  <a:srgbClr val="ff420e"/>
+                </a:solidFill>
+              </a:rPr>
+              <a:t>[.plx(Plexon), .nev, .nsx[x=1-9](BlackRock), .csv(ATRCSV)]</a:t>
+            </a:r>
+            <a:r>
+              <a:rPr lang="fi-FI" sz="1400">
+                <a:solidFill>
+                  <a:srgbClr val="ff420e"/>
+                </a:solidFill>
+              </a:rPr>
+              <a:t>です。尚、</a:t>
+            </a:r>
+            <a:r>
+              <a:rPr lang="fi-FI" sz="1400">
+                <a:solidFill>
+                  <a:srgbClr val="ff420e"/>
+                </a:solidFill>
+              </a:rPr>
+              <a:t>Plexon</a:t>
+            </a:r>
+            <a:r>
+              <a:rPr lang="fi-FI" sz="1400">
+                <a:solidFill>
+                  <a:srgbClr val="ff420e"/>
+                </a:solidFill>
+              </a:rPr>
+              <a:t>ファイルについては</a:t>
+            </a:r>
+            <a:r>
+              <a:rPr lang="fi-FI" sz="1400">
+                <a:solidFill>
+                  <a:srgbClr val="ff420e"/>
+                </a:solidFill>
+              </a:rPr>
+              <a:t>300MB</a:t>
+            </a:r>
+            <a:r>
+              <a:rPr lang="fi-FI" sz="1400">
+                <a:solidFill>
+                  <a:srgbClr val="ff420e"/>
+                </a:solidFill>
+              </a:rPr>
+              <a:t>を超えるファイルを変換する場合、メモリ不足が発生する可能性があります。</a:t>
+            </a:r>
+            <a:endParaRPr/>
+          </a:p>
+          <a:p>
+            <a:pPr>
+              <a:buSzPct val="45000"/>
+              <a:buFont typeface="StarSymbol"/>
+              <a:buChar char=""/>
+            </a:pPr>
+            <a:r>
+              <a:rPr lang="fi-FI" sz="1400">
+                <a:solidFill>
+                  <a:srgbClr val="ff420e"/>
+                </a:solidFill>
+              </a:rPr>
+              <a:t>(*2) : </a:t>
+            </a:r>
+            <a:r>
+              <a:rPr lang="fi-FI" sz="1400">
+                <a:solidFill>
+                  <a:srgbClr val="ff420e"/>
+                </a:solidFill>
+              </a:rPr>
+              <a:t>移動ではないため、元コンテンツは保持されます。</a:t>
+            </a:r>
             <a:endParaRPr/>
           </a:p>
         </p:txBody>
@@ -1872,7 +2029,7 @@
       </p:grpSpPr>
       <p:sp>
         <p:nvSpPr>
-          <p:cNvPr id="58" name="TextShape 1"/>
+          <p:cNvPr id="59" name="TextShape 1"/>
           <p:cNvSpPr txBox="1"/>
           <p:nvPr/>
         </p:nvSpPr>
@@ -1899,7 +2056,7 @@
       </p:sp>
       <p:sp>
         <p:nvSpPr>
-          <p:cNvPr id="59" name="TextShape 2"/>
+          <p:cNvPr id="60" name="TextShape 2"/>
           <p:cNvSpPr txBox="1"/>
           <p:nvPr/>
         </p:nvSpPr>
@@ -1922,114 +2079,51 @@
             </a:pPr>
             <a:r>
               <a:rPr lang="fi-FI" sz="1400"/>
+              <a:t>Explorer – Properties</a:t>
+            </a:r>
+            <a:r>
+              <a:rPr lang="fi-FI" sz="1400"/>
+              <a:t>の連携</a:t>
+            </a:r>
+            <a:endParaRPr/>
+          </a:p>
+          <a:p>
+            <a:pPr lvl="1">
+              <a:buSzPct val="45000"/>
+              <a:buFont typeface="StarSymbol"/>
+              <a:buChar char=""/>
+            </a:pPr>
+            <a:r>
+              <a:rPr lang="fi-FI" sz="1400"/>
+              <a:t>Explorer</a:t>
+            </a:r>
+            <a:r>
+              <a:rPr lang="fi-FI" sz="1400"/>
+              <a:t>の選択は、</a:t>
+            </a:r>
+            <a:r>
+              <a:rPr lang="fi-FI" sz="1400"/>
               <a:t>Properties</a:t>
             </a:r>
-            <a:endParaRPr/>
-          </a:p>
-          <a:p>
-            <a:pPr lvl="1">
-              <a:buSzPct val="45000"/>
-              <a:buFont typeface="StarSymbol"/>
-              <a:buChar char=""/>
-            </a:pPr>
-            <a:r>
-              <a:rPr lang="fi-FI" sz="1400"/>
-              <a:t>ファイルのプロパティビューアを提供します。</a:t>
-            </a:r>
-            <a:endParaRPr/>
-          </a:p>
-          <a:p>
-            <a:pPr lvl="1">
-              <a:buSzPct val="45000"/>
-              <a:buFont typeface="StarSymbol"/>
-              <a:buChar char=""/>
-            </a:pPr>
-            <a:r>
-              <a:rPr lang="fi-FI" sz="1400"/>
-              <a:t>エクスプローラー上で選択した項目のプロパティ情報を表示します。</a:t>
-            </a:r>
-            <a:endParaRPr/>
-          </a:p>
-          <a:p>
-            <a:pPr lvl="1">
-              <a:buSzPct val="45000"/>
-              <a:buFont typeface="StarSymbol"/>
-              <a:buChar char=""/>
-            </a:pPr>
-            <a:r>
-              <a:rPr lang="fi-FI" sz="1400"/>
-              <a:t>General</a:t>
-            </a:r>
-            <a:r>
-              <a:rPr lang="fi-FI" sz="1400"/>
-              <a:t>の項目にはファイルの一般情報が表示されます。</a:t>
-            </a:r>
-            <a:endParaRPr/>
-          </a:p>
-          <a:p>
-            <a:pPr lvl="1">
-              <a:buSzPct val="45000"/>
-              <a:buFont typeface="StarSymbol"/>
-              <a:buChar char=""/>
-            </a:pPr>
-            <a:r>
-              <a:rPr lang="fi-FI" sz="1400"/>
-              <a:t>Neuroshare</a:t>
-            </a:r>
-            <a:r>
-              <a:rPr lang="fi-FI" sz="1400"/>
-              <a:t>の項目は、選択したファイルが</a:t>
-            </a:r>
-            <a:r>
-              <a:rPr lang="fi-FI" sz="1400"/>
-              <a:t>Neuroshare</a:t>
-            </a:r>
-            <a:r>
-              <a:rPr lang="fi-FI" sz="1400"/>
-              <a:t>の場合にのみ表示されます。</a:t>
-            </a:r>
-            <a:endParaRPr/>
-          </a:p>
-          <a:p>
-            <a:pPr lvl="1">
-              <a:buSzPct val="45000"/>
-              <a:buFont typeface="StarSymbol"/>
-              <a:buChar char=""/>
-            </a:pPr>
-            <a:r>
-              <a:rPr lang="fi-FI" sz="1400"/>
-              <a:t>Neuroshare</a:t>
-            </a:r>
-            <a:r>
-              <a:rPr lang="fi-FI" sz="1400"/>
-              <a:t>の項目表示にエラーが出る場合は、ファイルフォーマットにエラーが含まれることが考えられます。ファイルフォーマットを確認してください。</a:t>
-            </a:r>
-            <a:endParaRPr/>
-          </a:p>
-        </p:txBody>
-      </p:sp>
-      <p:pic>
-        <p:nvPicPr>
-          <p:cNvPr descr="" id="60" name=""/>
-          <p:cNvPicPr/>
-          <p:nvPr/>
-        </p:nvPicPr>
-        <p:blipFill>
-          <a:blip r:embed="rId1"/>
-          <a:stretch>
-            <a:fillRect/>
-          </a:stretch>
-        </p:blipFill>
-        <p:spPr>
-          <a:xfrm>
-            <a:off x="4680720" y="5400000"/>
-            <a:ext cx="5219280" cy="1190160"/>
-          </a:xfrm>
-          <a:prstGeom prst="rect">
-            <a:avLst/>
-          </a:prstGeom>
-        </p:spPr>
-      </p:pic>
+            <a:r>
+              <a:rPr lang="fi-FI" sz="1400"/>
+              <a:t>の表示に影響します。選択したファイルの情報を知りたい場合は</a:t>
+            </a:r>
+            <a:r>
+              <a:rPr lang="fi-FI" sz="1400"/>
+              <a:t>Properties</a:t>
+            </a:r>
+            <a:r>
+              <a:rPr lang="fi-FI" sz="1400"/>
+              <a:t>との併用が便利です。</a:t>
+            </a:r>
+            <a:endParaRPr/>
+          </a:p>
+          <a:p>
+            <a:endParaRPr/>
+          </a:p>
+        </p:txBody>
+      </p:sp>
     </p:spTree>
   </p:cSld>
 </p:sld>
@@ -2104,7 +2198,7 @@
             </a:pPr>
             <a:r>
               <a:rPr lang="fi-FI" sz="1400"/>
-              <a:t>Workspace</a:t>
+              <a:t>Properties</a:t>
             </a:r>
             <a:endParaRPr/>
           </a:p>
@@ -2116,11 +2210,7 @@
             </a:pPr>
             <a:r>
               <a:rPr lang="fi-FI" sz="1400"/>
-              <a:t>Channel(*1)</a:t>
-            </a:r>
-            <a:r>
-              <a:rPr lang="fi-FI" sz="1400"/>
-              <a:t>形式でデータを一時的に保管します。</a:t>
+              <a:t>ファイルのプロパティビューアを提供します。</a:t>
             </a:r>
             <a:endParaRPr/>
           </a:p>
@@ -2132,19 +2222,7 @@
             </a:pPr>
             <a:r>
               <a:rPr lang="fi-FI" sz="1400"/>
-              <a:t>Delete</a:t>
-            </a:r>
-            <a:r>
-              <a:rPr lang="fi-FI" sz="1400"/>
-              <a:t>で選択した</a:t>
-            </a:r>
-            <a:r>
-              <a:rPr lang="fi-FI" sz="1400"/>
-              <a:t>Channel</a:t>
-            </a:r>
-            <a:r>
-              <a:rPr lang="fi-FI" sz="1400"/>
-              <a:t>を削除します。</a:t>
+              <a:t>エクスプローラー上で選択した項目のプロパティ情報を表示します。</a:t>
             </a:r>
             <a:endParaRPr/>
           </a:p>
@@ -2156,208 +2234,78 @@
             </a:pPr>
             <a:r>
               <a:rPr lang="fi-FI" sz="1400"/>
-              <a:t>アプリケーション自体を終了</a:t>
-            </a:r>
-            <a:r>
-              <a:rPr lang="fi-FI" sz="1400"/>
-              <a:t>(</a:t>
-            </a:r>
-            <a:r>
-              <a:rPr lang="fi-FI" sz="1400"/>
-              <a:t>閉じるボタンなどで</a:t>
-            </a:r>
-            <a:r>
-              <a:rPr lang="fi-FI" sz="1400"/>
-              <a:t>)</a:t>
-            </a:r>
-            <a:r>
-              <a:rPr lang="fi-FI" sz="1400"/>
-              <a:t>すると、</a:t>
-            </a:r>
-            <a:r>
-              <a:rPr lang="fi-FI" sz="1400"/>
-              <a:t>Workspace</a:t>
-            </a:r>
-            <a:r>
-              <a:rPr lang="fi-FI" sz="1400"/>
-              <a:t>上の</a:t>
-            </a:r>
-            <a:r>
-              <a:rPr lang="fi-FI" sz="1400"/>
-              <a:t>Channel</a:t>
-            </a:r>
-            <a:r>
-              <a:rPr lang="fi-FI" sz="1400"/>
-              <a:t>リストは削除されます。</a:t>
-            </a:r>
-            <a:endParaRPr/>
-          </a:p>
-        </p:txBody>
-      </p:sp>
-      <p:sp>
-        <p:nvSpPr>
-          <p:cNvPr id="63" name="CustomShape 3"/>
-          <p:cNvSpPr/>
-          <p:nvPr/>
-        </p:nvSpPr>
-        <p:spPr>
-          <a:xfrm>
-            <a:off x="8100000" y="2880000"/>
-            <a:ext cx="540000" cy="360000"/>
-          </a:xfrm>
-          <a:prstGeom prst="ellipse">
-            <a:avLst/>
-          </a:prstGeom>
-          <a:ln w="36000">
-            <a:solidFill>
-              <a:srgbClr val="00ff00"/>
-            </a:solidFill>
-            <a:round/>
-          </a:ln>
-        </p:spPr>
-      </p:sp>
-      <p:sp>
-        <p:nvSpPr>
-          <p:cNvPr id="64" name="TextShape 4"/>
-          <p:cNvSpPr txBox="1"/>
-          <p:nvPr/>
-        </p:nvSpPr>
-        <p:spPr>
-          <a:xfrm>
-            <a:off x="7524000" y="2736000"/>
-            <a:ext cx="839160" cy="346320"/>
-          </a:xfrm>
-          <a:prstGeom prst="rect">
-            <a:avLst/>
-          </a:prstGeom>
-        </p:spPr>
-        <p:txBody>
-          <a:bodyPr bIns="45000" lIns="90000" rIns="90000" tIns="45000" wrap="none"/>
-          <a:p>
-            <a:pPr algn="ctr"/>
-            <a:r>
-              <a:rPr lang="fi-FI"/>
-              <a:t>Delete</a:t>
-            </a:r>
-            <a:endParaRPr/>
-          </a:p>
-        </p:txBody>
-      </p:sp>
-      <p:sp>
-        <p:nvSpPr>
-          <p:cNvPr id="65" name="TextShape 5"/>
-          <p:cNvSpPr txBox="1"/>
-          <p:nvPr/>
-        </p:nvSpPr>
-        <p:spPr>
-          <a:xfrm>
-            <a:off x="499320" y="6917400"/>
-            <a:ext cx="7781400" cy="417960"/>
-          </a:xfrm>
-          <a:prstGeom prst="rect">
-            <a:avLst/>
-          </a:prstGeom>
-        </p:spPr>
-        <p:txBody>
-          <a:bodyPr bIns="0" lIns="0" rIns="0" tIns="0" wrap="none"/>
-          <a:p>
-            <a:pPr>
-              <a:buSzPct val="45000"/>
-              <a:buFont typeface="StarSymbol"/>
-              <a:buChar char=""/>
-            </a:pPr>
-            <a:r>
-              <a:rPr lang="fi-FI" sz="1400">
-                <a:solidFill>
-                  <a:srgbClr val="ff420e"/>
-                </a:solidFill>
-              </a:rPr>
-              <a:t>(*1) : Neuroshare</a:t>
-            </a:r>
-            <a:r>
-              <a:rPr lang="fi-FI" sz="1400">
-                <a:solidFill>
-                  <a:srgbClr val="ff420e"/>
-                </a:solidFill>
-              </a:rPr>
-              <a:t>データを</a:t>
-            </a:r>
-            <a:r>
-              <a:rPr lang="fi-FI" sz="1400">
-                <a:solidFill>
-                  <a:srgbClr val="ff420e"/>
-                </a:solidFill>
-              </a:rPr>
-              <a:t>Entity</a:t>
-            </a:r>
-            <a:r>
-              <a:rPr lang="fi-FI" sz="1400">
-                <a:solidFill>
-                  <a:srgbClr val="ff420e"/>
-                </a:solidFill>
-              </a:rPr>
-              <a:t>単位で分割したデータ形式。</a:t>
-            </a:r>
-            <a:r>
-              <a:rPr lang="fi-FI" sz="1400">
-                <a:solidFill>
-                  <a:srgbClr val="ff420e"/>
-                </a:solidFill>
-              </a:rPr>
+              <a:t>General</a:t>
+            </a:r>
+            <a:r>
+              <a:rPr lang="fi-FI" sz="1400"/>
+              <a:t>の項目にはファイルの一般情報が表示されます。</a:t>
+            </a:r>
+            <a:endParaRPr/>
+          </a:p>
+          <a:p>
+            <a:pPr lvl="1">
+              <a:buSzPct val="45000"/>
+              <a:buFont typeface="StarSymbol"/>
+              <a:buChar char=""/>
+            </a:pPr>
+            <a:r>
+              <a:rPr lang="fi-FI" sz="1400"/>
               <a:t>Neuroshare</a:t>
             </a:r>
             <a:r>
-              <a:rPr lang="fi-FI" sz="1400">
-                <a:solidFill>
-                  <a:srgbClr val="ff420e"/>
-                </a:solidFill>
-              </a:rPr>
-              <a:t>のデータ定義分存在する。</a:t>
-            </a:r>
-            <a:r>
-              <a:rPr lang="fi-FI" sz="1400">
-                <a:solidFill>
-                  <a:srgbClr val="ff420e"/>
-                </a:solidFill>
-              </a:rPr>
-              <a:t>(Event, Analog, Segment, NeuralEvent</a:t>
-            </a:r>
-            <a:r>
-              <a:rPr lang="fi-FI" sz="1400">
-                <a:solidFill>
-                  <a:srgbClr val="ff420e"/>
-                </a:solidFill>
-              </a:rPr>
-              <a:t>の</a:t>
-            </a:r>
-            <a:r>
-              <a:rPr lang="fi-FI" sz="1400">
-                <a:solidFill>
-                  <a:srgbClr val="ff420e"/>
-                </a:solidFill>
-              </a:rPr>
-              <a:t>4</a:t>
-            </a:r>
-            <a:r>
-              <a:rPr lang="fi-FI" sz="1400">
-                <a:solidFill>
-                  <a:srgbClr val="ff420e"/>
-                </a:solidFill>
-              </a:rPr>
-              <a:t>種類</a:t>
-            </a:r>
-            <a:r>
-              <a:rPr lang="fi-FI" sz="1400">
-                <a:solidFill>
-                  <a:srgbClr val="ff420e"/>
-                </a:solidFill>
-              </a:rPr>
-              <a:t>)</a:t>
-            </a:r>
-            <a:endParaRPr/>
-          </a:p>
-        </p:txBody>
-      </p:sp>
+              <a:rPr lang="fi-FI" sz="1400"/>
+              <a:t>の項目は、選択したファイルが</a:t>
+            </a:r>
+            <a:r>
+              <a:rPr lang="fi-FI" sz="1400"/>
+              <a:t>Neuroshare</a:t>
+            </a:r>
+            <a:r>
+              <a:rPr lang="fi-FI" sz="1400"/>
+              <a:t>の場合にのみ表示されます。</a:t>
+            </a:r>
+            <a:endParaRPr/>
+          </a:p>
+          <a:p>
+            <a:pPr lvl="1">
+              <a:buSzPct val="45000"/>
+              <a:buFont typeface="StarSymbol"/>
+              <a:buChar char=""/>
+            </a:pPr>
+            <a:r>
+              <a:rPr lang="fi-FI" sz="1400"/>
+              <a:t>Neuroshare</a:t>
+            </a:r>
+            <a:r>
+              <a:rPr lang="fi-FI" sz="1400"/>
+              <a:t>の項目表示にエラーが出る場合は、ファイルフォーマットにエラーが含まれることが考えられます。ファイルフォーマットを確認してください。</a:t>
+            </a:r>
+            <a:endParaRPr/>
+          </a:p>
+        </p:txBody>
+      </p:sp>
+      <p:pic>
+        <p:nvPicPr>
+          <p:cNvPr descr="" id="63" name=""/>
+          <p:cNvPicPr/>
+          <p:nvPr/>
+        </p:nvPicPr>
+        <p:blipFill>
+          <a:blip r:embed="rId1"/>
+          <a:stretch>
+            <a:fillRect/>
+          </a:stretch>
+        </p:blipFill>
+        <p:spPr>
+          <a:xfrm>
+            <a:off x="4680720" y="5400000"/>
+            <a:ext cx="5219280" cy="1190160"/>
+          </a:xfrm>
+          <a:prstGeom prst="rect">
+            <a:avLst/>
+          </a:prstGeom>
+        </p:spPr>
+      </p:pic>
     </p:spTree>
   </p:cSld>
 </p:sld>
@@ -2382,7 +2330,7 @@
       </p:grpSpPr>
       <p:sp>
         <p:nvSpPr>
-          <p:cNvPr id="66" name="TextShape 1"/>
+          <p:cNvPr id="64" name="TextShape 1"/>
           <p:cNvSpPr txBox="1"/>
           <p:nvPr/>
         </p:nvSpPr>
@@ -2409,7 +2357,7 @@
       </p:sp>
       <p:sp>
         <p:nvSpPr>
-          <p:cNvPr id="67" name="TextShape 2"/>
+          <p:cNvPr id="65" name="TextShape 2"/>
           <p:cNvSpPr txBox="1"/>
           <p:nvPr/>
         </p:nvSpPr>
@@ -2444,11 +2392,27 @@
             </a:pPr>
             <a:r>
               <a:rPr lang="fi-FI" sz="1400"/>
-              <a:t>Export</a:t>
-            </a:r>
-            <a:r>
-              <a:rPr lang="fi-FI" sz="1400"/>
-              <a:t>で</a:t>
+              <a:t>Channel(*1)</a:t>
+            </a:r>
+            <a:r>
+              <a:rPr lang="fi-FI" sz="1400"/>
+              <a:t>形式でデータを一時的に保管します。</a:t>
+            </a:r>
+            <a:endParaRPr/>
+          </a:p>
+          <a:p>
+            <a:pPr lvl="1">
+              <a:buSzPct val="45000"/>
+              <a:buFont typeface="StarSymbol"/>
+              <a:buChar char=""/>
+            </a:pPr>
+            <a:r>
+              <a:rPr lang="fi-FI" sz="1400"/>
+              <a:t>Delete</a:t>
+            </a:r>
+            <a:r>
+              <a:rPr lang="fi-FI" sz="1400"/>
+              <a:t>で選択した</a:t>
             </a:r>
             <a:r>
               <a:rPr lang="fi-FI" sz="1400"/>
@@ -2456,15 +2420,7 @@
             </a:r>
             <a:r>
               <a:rPr lang="fi-FI" sz="1400"/>
-              <a:t>リストを元に</a:t>
-            </a:r>
-            <a:r>
-              <a:rPr lang="fi-FI" sz="1400"/>
-              <a:t>Neuroshare</a:t>
-            </a:r>
-            <a:r>
-              <a:rPr lang="fi-FI" sz="1400"/>
-              <a:t>形式にエクスポートします。</a:t>
+              <a:t>を削除します。</a:t>
             </a:r>
             <a:endParaRPr/>
           </a:p>
@@ -2476,84 +2432,53 @@
             </a:pPr>
             <a:r>
               <a:rPr lang="fi-FI" sz="1400"/>
-              <a:t>Neuroshare</a:t>
-            </a:r>
-            <a:r>
-              <a:rPr lang="fi-FI" sz="1400"/>
-              <a:t>形式にエクスポートする際は、以下</a:t>
-            </a:r>
-            <a:r>
-              <a:rPr lang="fi-FI" sz="1400"/>
-              <a:t>3</a:t>
-            </a:r>
-            <a:r>
-              <a:rPr lang="fi-FI" sz="1400"/>
-              <a:t>つの手順を行う必要があります。</a:t>
-            </a:r>
-            <a:endParaRPr/>
-          </a:p>
-          <a:p>
-            <a:pPr lvl="2">
-              <a:buSzPct val="45000"/>
-              <a:buFont typeface="StarSymbol"/>
-              <a:buChar char=""/>
-            </a:pPr>
-            <a:r>
-              <a:rPr lang="fi-FI" sz="1100"/>
-              <a:t>1. </a:t>
-            </a:r>
-            <a:r>
-              <a:rPr lang="fi-FI" sz="1100"/>
-              <a:t>ファイル保存先の指定。</a:t>
-            </a:r>
-            <a:endParaRPr/>
-          </a:p>
-          <a:p>
-            <a:pPr lvl="2">
-              <a:buSzPct val="45000"/>
-              <a:buFont typeface="StarSymbol"/>
-              <a:buChar char=""/>
-            </a:pPr>
-            <a:r>
-              <a:rPr lang="fi-FI" sz="1100"/>
-              <a:t>2. Channel</a:t>
-            </a:r>
-            <a:r>
-              <a:rPr lang="fi-FI" sz="1100"/>
-              <a:t>の選択。</a:t>
-            </a:r>
-            <a:endParaRPr/>
-          </a:p>
-          <a:p>
-            <a:pPr lvl="2">
-              <a:buSzPct val="45000"/>
-              <a:buFont typeface="StarSymbol"/>
-              <a:buChar char=""/>
-            </a:pPr>
-            <a:r>
-              <a:rPr lang="fi-FI" sz="1100"/>
-              <a:t>3. </a:t>
-            </a:r>
-            <a:r>
-              <a:rPr lang="fi-FI" sz="1100"/>
-              <a:t>メタ情報の付加。</a:t>
-            </a:r>
-            <a:endParaRPr/>
-          </a:p>
-          <a:p>
-            <a:endParaRPr/>
-          </a:p>
-        </p:txBody>
-      </p:sp>
-      <p:sp>
-        <p:nvSpPr>
-          <p:cNvPr id="68" name="CustomShape 3"/>
+              <a:t>アプリケーション自体を終了</a:t>
+            </a:r>
+            <a:r>
+              <a:rPr lang="fi-FI" sz="1400"/>
+              <a:t>(</a:t>
+            </a:r>
+            <a:r>
+              <a:rPr lang="fi-FI" sz="1400"/>
+              <a:t>閉じるボタンなどで</a:t>
+            </a:r>
+            <a:r>
+              <a:rPr lang="fi-FI" sz="1400"/>
+              <a:t>)</a:t>
+            </a:r>
+            <a:r>
+              <a:rPr lang="fi-FI" sz="1400"/>
+              <a:t>すると、</a:t>
+            </a:r>
+            <a:r>
+              <a:rPr lang="fi-FI" sz="1400"/>
+              <a:t>Workspace</a:t>
+            </a:r>
+            <a:r>
+              <a:rPr lang="fi-FI" sz="1400"/>
+              <a:t>上の</a:t>
+            </a:r>
+            <a:r>
+              <a:rPr lang="fi-FI" sz="1400"/>
+              <a:t>Channel</a:t>
+            </a:r>
+            <a:r>
+              <a:rPr lang="fi-FI" sz="1400"/>
+              <a:t>リストは削除されます。</a:t>
+            </a:r>
+            <a:endParaRPr/>
+          </a:p>
+        </p:txBody>
+      </p:sp>
+      <p:sp>
+        <p:nvSpPr>
+          <p:cNvPr id="66" name="CustomShape 3"/>
           <p:cNvSpPr/>
           <p:nvPr/>
         </p:nvSpPr>
         <p:spPr>
           <a:xfrm>
-            <a:off x="7920000" y="1584000"/>
+            <a:off x="8100000" y="2880000"/>
             <a:ext cx="540000" cy="360000"/>
           </a:xfrm>
           <a:prstGeom prst="ellipse">
@@ -2569,14 +2494,14 @@
       </p:sp>
       <p:sp>
         <p:nvSpPr>
-          <p:cNvPr id="69" name="TextShape 4"/>
-          <p:cNvSpPr txBox="1"/>
-          <p:nvPr/>
-        </p:nvSpPr>
-        <p:spPr>
-          <a:xfrm>
-            <a:off x="7344000" y="1440000"/>
-            <a:ext cx="840600" cy="346320"/>
+          <p:cNvPr id="67" name="TextShape 4"/>
+          <p:cNvSpPr txBox="1"/>
+          <p:nvPr/>
+        </p:nvSpPr>
+        <p:spPr>
+          <a:xfrm>
+            <a:off x="7524000" y="2736000"/>
+            <a:ext cx="839160" cy="346320"/>
           </a:xfrm>
           <a:prstGeom prst="rect">
             <a:avLst/>
@@ -2588,220 +2513,122 @@
             <a:pPr algn="ctr"/>
             <a:r>
               <a:rPr lang="fi-FI"/>
-              <a:t>Export</a:t>
-            </a:r>
-            <a:endParaRPr/>
-          </a:p>
-        </p:txBody>
-      </p:sp>
-      <p:pic>
-        <p:nvPicPr>
-          <p:cNvPr descr="" id="70" name=""/>
-          <p:cNvPicPr/>
-          <p:nvPr/>
-        </p:nvPicPr>
-        <p:blipFill>
-          <a:blip r:embed="rId1"/>
-          <a:stretch>
-            <a:fillRect/>
-          </a:stretch>
-        </p:blipFill>
-        <p:spPr>
-          <a:xfrm>
-            <a:off x="6440760" y="3060000"/>
-            <a:ext cx="1911240" cy="1288800"/>
-          </a:xfrm>
-          <a:prstGeom prst="rect">
-            <a:avLst/>
-          </a:prstGeom>
-        </p:spPr>
-      </p:pic>
-      <p:pic>
-        <p:nvPicPr>
-          <p:cNvPr descr="" id="71" name=""/>
-          <p:cNvPicPr/>
-          <p:nvPr/>
-        </p:nvPicPr>
-        <p:blipFill>
-          <a:blip r:embed="rId2"/>
-          <a:stretch>
-            <a:fillRect/>
-          </a:stretch>
-        </p:blipFill>
-        <p:spPr>
-          <a:xfrm>
-            <a:off x="5499720" y="4680000"/>
-            <a:ext cx="1664280" cy="2222640"/>
-          </a:xfrm>
-          <a:prstGeom prst="rect">
-            <a:avLst/>
-          </a:prstGeom>
-        </p:spPr>
-      </p:pic>
-      <p:pic>
-        <p:nvPicPr>
-          <p:cNvPr descr="" id="72" name=""/>
-          <p:cNvPicPr/>
-          <p:nvPr/>
-        </p:nvPicPr>
-        <p:blipFill>
-          <a:blip r:embed="rId3"/>
-          <a:stretch>
-            <a:fillRect/>
-          </a:stretch>
-        </p:blipFill>
-        <p:spPr>
-          <a:xfrm>
-            <a:off x="7740000" y="4698360"/>
-            <a:ext cx="1650600" cy="2204280"/>
-          </a:xfrm>
-          <a:prstGeom prst="rect">
-            <a:avLst/>
-          </a:prstGeom>
-        </p:spPr>
-      </p:pic>
-      <p:sp>
-        <p:nvSpPr>
-          <p:cNvPr id="73" name="Line 5"/>
-          <p:cNvSpPr/>
-          <p:nvPr/>
-        </p:nvSpPr>
-        <p:spPr>
-          <a:xfrm>
-            <a:off x="8088840" y="1980000"/>
-            <a:ext cx="0" cy="1260000"/>
-          </a:xfrm>
-          <a:prstGeom prst="line">
-            <a:avLst/>
-          </a:prstGeom>
-          <a:ln>
-            <a:solidFill>
-              <a:srgbClr val="000000"/>
-            </a:solidFill>
-            <a:tailEnd len="med" type="triangle" w="med"/>
-          </a:ln>
-        </p:spPr>
-      </p:sp>
-      <p:sp>
-        <p:nvSpPr>
-          <p:cNvPr id="74" name="TextShape 6"/>
-          <p:cNvSpPr txBox="1"/>
-          <p:nvPr/>
-        </p:nvSpPr>
-        <p:spPr>
-          <a:xfrm>
-            <a:off x="7440840" y="3464640"/>
-            <a:ext cx="371160" cy="351360"/>
-          </a:xfrm>
-          <a:prstGeom prst="rect">
-            <a:avLst/>
-          </a:prstGeom>
-        </p:spPr>
-        <p:txBody>
-          <a:bodyPr bIns="45000" lIns="90000" rIns="90000" tIns="45000" wrap="none"/>
-          <a:p>
-            <a:pPr algn="ctr"/>
-            <a:r>
-              <a:rPr lang="fi-FI"/>
-              <a:t>1.</a:t>
-            </a:r>
-            <a:endParaRPr/>
-          </a:p>
-        </p:txBody>
-      </p:sp>
-      <p:sp>
-        <p:nvSpPr>
-          <p:cNvPr id="75" name="Line 7"/>
-          <p:cNvSpPr/>
-          <p:nvPr/>
-        </p:nvSpPr>
-        <p:spPr>
-          <a:xfrm>
-            <a:off x="7920000" y="4140000"/>
-            <a:ext cx="180000" cy="540000"/>
-          </a:xfrm>
-          <a:prstGeom prst="line">
-            <a:avLst/>
-          </a:prstGeom>
-          <a:ln>
-            <a:solidFill>
-              <a:srgbClr val="000000"/>
-            </a:solidFill>
-            <a:tailEnd len="med" type="triangle" w="med"/>
-          </a:ln>
-        </p:spPr>
-      </p:sp>
-      <p:sp>
-        <p:nvSpPr>
-          <p:cNvPr id="76" name="TextShape 8"/>
-          <p:cNvSpPr txBox="1"/>
-          <p:nvPr/>
-        </p:nvSpPr>
-        <p:spPr>
-          <a:xfrm>
-            <a:off x="7981200" y="5976000"/>
-            <a:ext cx="371160" cy="346320"/>
-          </a:xfrm>
-          <a:prstGeom prst="rect">
-            <a:avLst/>
-          </a:prstGeom>
-        </p:spPr>
-        <p:txBody>
-          <a:bodyPr bIns="45000" lIns="90000" rIns="90000" tIns="45000" wrap="none"/>
-          <a:p>
-            <a:pPr algn="ctr"/>
-            <a:r>
-              <a:rPr lang="fi-FI"/>
-              <a:t>2.</a:t>
-            </a:r>
-            <a:endParaRPr/>
-          </a:p>
-        </p:txBody>
-      </p:sp>
-      <p:sp>
-        <p:nvSpPr>
-          <p:cNvPr id="77" name="Line 9"/>
-          <p:cNvSpPr/>
-          <p:nvPr/>
-        </p:nvSpPr>
-        <p:spPr>
-          <a:xfrm flipH="1">
-            <a:off x="6984000" y="6480000"/>
-            <a:ext cx="720000" cy="0"/>
-          </a:xfrm>
-          <a:prstGeom prst="line">
-            <a:avLst/>
-          </a:prstGeom>
-          <a:ln>
-            <a:solidFill>
-              <a:srgbClr val="000000"/>
-            </a:solidFill>
-            <a:tailEnd len="med" type="triangle" w="med"/>
-          </a:ln>
-        </p:spPr>
-      </p:sp>
-      <p:sp>
-        <p:nvSpPr>
-          <p:cNvPr id="78" name="TextShape 10"/>
-          <p:cNvSpPr txBox="1"/>
-          <p:nvPr/>
-        </p:nvSpPr>
-        <p:spPr>
-          <a:xfrm>
-            <a:off x="6577560" y="5962320"/>
-            <a:ext cx="371160" cy="548640"/>
-          </a:xfrm>
-          <a:prstGeom prst="rect">
-            <a:avLst/>
-          </a:prstGeom>
-        </p:spPr>
-        <p:txBody>
-          <a:bodyPr bIns="45000" lIns="90000" rIns="90000" tIns="45000" wrap="none"/>
-          <a:p>
-            <a:pPr algn="ctr"/>
-            <a:r>
-              <a:rPr lang="fi-FI"/>
-              <a:t>3.</a:t>
+              <a:t>Delete</a:t>
+            </a:r>
+            <a:endParaRPr/>
+          </a:p>
+        </p:txBody>
+      </p:sp>
+      <p:sp>
+        <p:nvSpPr>
+          <p:cNvPr id="68" name="TextShape 5"/>
+          <p:cNvSpPr txBox="1"/>
+          <p:nvPr/>
+        </p:nvSpPr>
+        <p:spPr>
+          <a:xfrm>
+            <a:off x="499320" y="6917400"/>
+            <a:ext cx="7781400" cy="417960"/>
+          </a:xfrm>
+          <a:prstGeom prst="rect">
+            <a:avLst/>
+          </a:prstGeom>
+        </p:spPr>
+        <p:txBody>
+          <a:bodyPr bIns="0" lIns="0" rIns="0" tIns="0" wrap="none"/>
+          <a:p>
+            <a:pPr>
+              <a:buSzPct val="45000"/>
+              <a:buFont typeface="StarSymbol"/>
+              <a:buChar char=""/>
+            </a:pPr>
+            <a:r>
+              <a:rPr lang="fi-FI" sz="1400">
+                <a:solidFill>
+                  <a:srgbClr val="ff420e"/>
+                </a:solidFill>
+              </a:rPr>
+              <a:t>(*1) : Neuroshare</a:t>
+            </a:r>
+            <a:r>
+              <a:rPr lang="fi-FI" sz="1400">
+                <a:solidFill>
+                  <a:srgbClr val="ff420e"/>
+                </a:solidFill>
+              </a:rPr>
+              <a:t>データを</a:t>
+            </a:r>
+            <a:r>
+              <a:rPr lang="fi-FI" sz="1400">
+                <a:solidFill>
+                  <a:srgbClr val="ff420e"/>
+                </a:solidFill>
+              </a:rPr>
+              <a:t>Entity</a:t>
+            </a:r>
+            <a:r>
+              <a:rPr lang="fi-FI" sz="1400">
+                <a:solidFill>
+                  <a:srgbClr val="ff420e"/>
+                </a:solidFill>
+              </a:rPr>
+              <a:t>単位で分割したデータ形式。</a:t>
+            </a:r>
+            <a:r>
+              <a:rPr lang="fi-FI" sz="1400">
+                <a:solidFill>
+                  <a:srgbClr val="ff420e"/>
+                </a:solidFill>
+              </a:rPr>
+              <a:t>Neuroshare</a:t>
+            </a:r>
+            <a:r>
+              <a:rPr lang="fi-FI" sz="1400">
+                <a:solidFill>
+                  <a:srgbClr val="ff420e"/>
+                </a:solidFill>
+              </a:rPr>
+              <a:t>のデータ定義分存在する。</a:t>
+            </a:r>
+            <a:r>
+              <a:rPr lang="fi-FI" sz="1400">
+                <a:solidFill>
+                  <a:srgbClr val="ff420e"/>
+                </a:solidFill>
+              </a:rPr>
+              <a:t>(Event, Analog, Segment, NeuralEvent</a:t>
+            </a:r>
+            <a:r>
+              <a:rPr lang="fi-FI" sz="1400">
+                <a:solidFill>
+                  <a:srgbClr val="ff420e"/>
+                </a:solidFill>
+              </a:rPr>
+              <a:t>の</a:t>
+            </a:r>
+            <a:r>
+              <a:rPr lang="fi-FI" sz="1400">
+                <a:solidFill>
+                  <a:srgbClr val="ff420e"/>
+                </a:solidFill>
+              </a:rPr>
+              <a:t>4</a:t>
+            </a:r>
+            <a:r>
+              <a:rPr lang="fi-FI" sz="1400">
+                <a:solidFill>
+                  <a:srgbClr val="ff420e"/>
+                </a:solidFill>
+              </a:rPr>
+              <a:t>種類</a:t>
+            </a:r>
+            <a:r>
+              <a:rPr lang="fi-FI" sz="1400">
+                <a:solidFill>
+                  <a:srgbClr val="ff420e"/>
+                </a:solidFill>
+              </a:rPr>
+              <a:t>)</a:t>
             </a:r>
             <a:endParaRPr/>
           </a:p>
@@ -2927,7 +2754,7 @@
       </p:grpSpPr>
       <p:sp>
         <p:nvSpPr>
-          <p:cNvPr id="79" name="TextShape 1"/>
+          <p:cNvPr id="69" name="TextShape 1"/>
           <p:cNvSpPr txBox="1"/>
           <p:nvPr/>
         </p:nvSpPr>
@@ -2954,7 +2781,7 @@
       </p:sp>
       <p:sp>
         <p:nvSpPr>
-          <p:cNvPr id="80" name="TextShape 2"/>
+          <p:cNvPr id="70" name="TextShape 2"/>
           <p:cNvSpPr txBox="1"/>
           <p:nvPr/>
         </p:nvSpPr>
@@ -2989,7 +2816,7 @@
             </a:pPr>
             <a:r>
               <a:rPr lang="fi-FI" sz="1400"/>
-              <a:t>Import</a:t>
+              <a:t>Export</a:t>
             </a:r>
             <a:r>
               <a:rPr lang="fi-FI" sz="1400"/>
@@ -3001,15 +2828,15 @@
             </a:r>
             <a:r>
               <a:rPr lang="fi-FI" sz="1400"/>
-              <a:t>リストに</a:t>
-            </a:r>
-            <a:r>
-              <a:rPr lang="fi-FI" sz="1400"/>
-              <a:t>Channel</a:t>
-            </a:r>
-            <a:r>
-              <a:rPr lang="fi-FI" sz="1400"/>
-              <a:t>を追加します。</a:t>
+              <a:t>リストを元に</a:t>
+            </a:r>
+            <a:r>
+              <a:rPr lang="fi-FI" sz="1400"/>
+              <a:t>Neuroshare</a:t>
+            </a:r>
+            <a:r>
+              <a:rPr lang="fi-FI" sz="1400"/>
+              <a:t>形式にエクスポートします。</a:t>
             </a:r>
             <a:endParaRPr/>
           </a:p>
@@ -3021,43 +2848,19 @@
             </a:pPr>
             <a:r>
               <a:rPr lang="fi-FI" sz="1400"/>
-              <a:t>尚、</a:t>
-            </a:r>
-            <a:r>
-              <a:rPr lang="fi-FI" sz="1400"/>
-              <a:t>Workspace</a:t>
-            </a:r>
-            <a:r>
-              <a:rPr lang="fi-FI" sz="1400"/>
-              <a:t>の</a:t>
-            </a:r>
-            <a:r>
-              <a:rPr lang="fi-FI" sz="1400"/>
-              <a:t>Channel</a:t>
-            </a:r>
-            <a:r>
-              <a:rPr lang="fi-FI" sz="1400"/>
-              <a:t>リストに</a:t>
-            </a:r>
-            <a:r>
-              <a:rPr lang="fi-FI" sz="1400"/>
-              <a:t>Channel</a:t>
-            </a:r>
-            <a:r>
-              <a:rPr lang="fi-FI" sz="1400"/>
-              <a:t>を追加する方法は、下記</a:t>
-            </a:r>
-            <a:r>
-              <a:rPr lang="fi-FI" sz="1400"/>
-              <a:t>2</a:t>
-            </a:r>
-            <a:r>
-              <a:rPr lang="fi-FI" sz="1400"/>
-              <a:t>通りあります</a:t>
-            </a:r>
-            <a:r>
-              <a:rPr lang="fi-FI" sz="1400"/>
-              <a:t>.</a:t>
+              <a:t>Neuroshare</a:t>
+            </a:r>
+            <a:r>
+              <a:rPr lang="fi-FI" sz="1400"/>
+              <a:t>形式にエクスポートする際は、以下</a:t>
+            </a:r>
+            <a:r>
+              <a:rPr lang="fi-FI" sz="1400"/>
+              <a:t>3</a:t>
+            </a:r>
+            <a:r>
+              <a:rPr lang="fi-FI" sz="1400"/>
+              <a:t>つの手順を行う必要があります。</a:t>
             </a:r>
             <a:endParaRPr/>
           </a:p>
@@ -3069,249 +2872,95 @@
             </a:pPr>
             <a:r>
               <a:rPr lang="fi-FI" sz="1100"/>
-              <a:t>1. Workspace</a:t>
+              <a:t>1. </a:t>
             </a:r>
             <a:r>
               <a:rPr lang="fi-FI" sz="1100"/>
-              <a:t>の</a:t>
-            </a:r>
+              <a:t>ファイル保存先の指定。</a:t>
+            </a:r>
+            <a:endParaRPr/>
+          </a:p>
+          <a:p>
+            <a:pPr lvl="2">
+              <a:buSzPct val="45000"/>
+              <a:buFont typeface="StarSymbol"/>
+              <a:buChar char=""/>
+            </a:pPr>
             <a:r>
               <a:rPr lang="fi-FI" sz="1100"/>
-              <a:t>Import</a:t>
+              <a:t>2. Channel</a:t>
             </a:r>
             <a:r>
               <a:rPr lang="fi-FI" sz="1100"/>
-              <a:t>をクリック、</a:t>
-            </a:r>
+              <a:t>の選択。</a:t>
+            </a:r>
+            <a:endParaRPr/>
+          </a:p>
+          <a:p>
+            <a:pPr lvl="2">
+              <a:buSzPct val="45000"/>
+              <a:buFont typeface="StarSymbol"/>
+              <a:buChar char=""/>
+            </a:pPr>
             <a:r>
               <a:rPr lang="fi-FI" sz="1100"/>
-              <a:t>Neuroshare</a:t>
+              <a:t>3. </a:t>
             </a:r>
             <a:r>
               <a:rPr lang="fi-FI" sz="1100"/>
-              <a:t>ファイル</a:t>
-            </a:r>
-            <a:r>
-              <a:rPr lang="fi-FI" sz="1100"/>
-              <a:t>(*1)</a:t>
-            </a:r>
-            <a:r>
-              <a:rPr lang="fi-FI" sz="1100"/>
-              <a:t>を選択した後、</a:t>
-            </a:r>
-            <a:r>
-              <a:rPr lang="fi-FI" sz="1100"/>
-              <a:t>Workspace</a:t>
-            </a:r>
-            <a:r>
-              <a:rPr lang="fi-FI" sz="1100"/>
-              <a:t>に追加する</a:t>
-            </a:r>
-            <a:r>
-              <a:rPr lang="fi-FI" sz="1100"/>
-              <a:t>Channel</a:t>
-            </a:r>
-            <a:r>
-              <a:rPr lang="fi-FI" sz="1100"/>
-              <a:t>を選択します。</a:t>
-            </a:r>
-            <a:endParaRPr/>
-          </a:p>
-          <a:p>
-            <a:pPr lvl="2">
-              <a:buSzPct val="45000"/>
-              <a:buFont typeface="StarSymbol"/>
-              <a:buChar char=""/>
-            </a:pPr>
-            <a:r>
-              <a:rPr lang="fi-FI" sz="1100"/>
-              <a:t>2. </a:t>
-            </a:r>
-            <a:r>
-              <a:rPr lang="fi-FI" sz="1100"/>
-              <a:t>エクスプローラー上で</a:t>
-            </a:r>
-            <a:r>
-              <a:rPr lang="fi-FI" sz="1100"/>
-              <a:t>Neuroshare</a:t>
-            </a:r>
-            <a:r>
-              <a:rPr lang="fi-FI" sz="1100"/>
-              <a:t>ファイル</a:t>
-            </a:r>
-            <a:r>
-              <a:rPr lang="fi-FI" sz="1100"/>
-              <a:t>(*1)</a:t>
-            </a:r>
-            <a:r>
-              <a:rPr lang="fi-FI" sz="1100"/>
-              <a:t>を選択し、右クリック → </a:t>
-            </a:r>
-            <a:r>
-              <a:rPr lang="fi-FI" sz="1100"/>
-              <a:t>Copy To Workspace </a:t>
-            </a:r>
-            <a:r>
-              <a:rPr lang="fi-FI" sz="1100"/>
-              <a:t>を押下した後、</a:t>
-            </a:r>
-            <a:r>
-              <a:rPr lang="fi-FI" sz="1100"/>
-              <a:t>Workspace</a:t>
-            </a:r>
-            <a:r>
-              <a:rPr lang="fi-FI" sz="1100"/>
-              <a:t>に追加する</a:t>
-            </a:r>
-            <a:r>
-              <a:rPr lang="fi-FI" sz="1100"/>
-              <a:t>Channel</a:t>
-            </a:r>
-            <a:r>
-              <a:rPr lang="fi-FI" sz="1100"/>
-              <a:t>を選択します。</a:t>
-            </a:r>
-            <a:endParaRPr/>
-          </a:p>
-          <a:p>
-            <a:endParaRPr/>
-          </a:p>
-        </p:txBody>
-      </p:sp>
-      <p:sp>
-        <p:nvSpPr>
-          <p:cNvPr id="81" name="TextShape 3"/>
-          <p:cNvSpPr txBox="1"/>
-          <p:nvPr/>
-        </p:nvSpPr>
-        <p:spPr>
-          <a:xfrm>
-            <a:off x="174960" y="6881040"/>
-            <a:ext cx="9041040" cy="626760"/>
-          </a:xfrm>
-          <a:prstGeom prst="rect">
-            <a:avLst/>
-          </a:prstGeom>
-        </p:spPr>
-        <p:txBody>
-          <a:bodyPr bIns="0" lIns="0" rIns="0" tIns="0" wrap="none"/>
-          <a:p>
-            <a:pPr>
-              <a:buSzPct val="45000"/>
-              <a:buFont typeface="StarSymbol"/>
-              <a:buChar char=""/>
-            </a:pPr>
-            <a:r>
-              <a:rPr lang="fi-FI" sz="1400">
-                <a:solidFill>
-                  <a:srgbClr val="ff420e"/>
-                </a:solidFill>
-              </a:rPr>
-              <a:t>(*1) : Neuroshare</a:t>
-            </a:r>
-            <a:r>
-              <a:rPr lang="fi-FI" sz="1400">
-                <a:solidFill>
-                  <a:srgbClr val="ff420e"/>
-                </a:solidFill>
-              </a:rPr>
-              <a:t>形式のみ許可されます。</a:t>
-            </a:r>
-            <a:r>
-              <a:rPr lang="fi-FI" sz="1400">
-                <a:solidFill>
-                  <a:srgbClr val="ff420e"/>
-                </a:solidFill>
-              </a:rPr>
-              <a:t>Neural</a:t>
-            </a:r>
-            <a:r>
-              <a:rPr lang="fi-FI" sz="1400">
-                <a:solidFill>
-                  <a:srgbClr val="ff420e"/>
-                </a:solidFill>
-              </a:rPr>
-              <a:t>データを含む他のデータフォーマット</a:t>
-            </a:r>
-            <a:r>
-              <a:rPr lang="fi-FI" sz="1400">
-                <a:solidFill>
-                  <a:srgbClr val="ff420e"/>
-                </a:solidFill>
-              </a:rPr>
-              <a:t>[.plx(Plexon), .nev, .nsx[x=1-9](BlackRock), .csv(ATRCSV)]</a:t>
-            </a:r>
-            <a:r>
-              <a:rPr lang="fi-FI" sz="1400">
-                <a:solidFill>
-                  <a:srgbClr val="ff420e"/>
-                </a:solidFill>
-              </a:rPr>
-              <a:t>の場合、</a:t>
-            </a:r>
-            <a:r>
-              <a:rPr lang="fi-FI" sz="1400">
-                <a:solidFill>
-                  <a:srgbClr val="ff420e"/>
-                </a:solidFill>
-              </a:rPr>
-              <a:t>Explorer</a:t>
-            </a:r>
-            <a:r>
-              <a:rPr lang="fi-FI" sz="1400">
-                <a:solidFill>
-                  <a:srgbClr val="ff420e"/>
-                </a:solidFill>
-              </a:rPr>
-              <a:t>の機能</a:t>
-            </a:r>
-            <a:r>
-              <a:rPr lang="fi-FI" sz="1400">
-                <a:solidFill>
-                  <a:srgbClr val="ff420e"/>
-                </a:solidFill>
-              </a:rPr>
-              <a:t>(Convert To Neuroshare)</a:t>
-            </a:r>
-            <a:r>
-              <a:rPr lang="fi-FI" sz="1400">
-                <a:solidFill>
-                  <a:srgbClr val="ff420e"/>
-                </a:solidFill>
-              </a:rPr>
-              <a:t>を使用して</a:t>
-            </a:r>
-            <a:r>
-              <a:rPr lang="fi-FI" sz="1400">
-                <a:solidFill>
-                  <a:srgbClr val="ff420e"/>
-                </a:solidFill>
-              </a:rPr>
-              <a:t>Neuroshare</a:t>
-            </a:r>
-            <a:r>
-              <a:rPr lang="fi-FI" sz="1400">
-                <a:solidFill>
-                  <a:srgbClr val="ff420e"/>
-                </a:solidFill>
-              </a:rPr>
-              <a:t>に変換後、</a:t>
-            </a:r>
-            <a:r>
-              <a:rPr lang="fi-FI" sz="1400">
-                <a:solidFill>
-                  <a:srgbClr val="ff420e"/>
-                </a:solidFill>
-              </a:rPr>
-              <a:t>Channel</a:t>
-            </a:r>
-            <a:r>
-              <a:rPr lang="fi-FI" sz="1400">
-                <a:solidFill>
-                  <a:srgbClr val="ff420e"/>
-                </a:solidFill>
-              </a:rPr>
-              <a:t>を追加してください。</a:t>
+              <a:t>メタ情報の付加。</a:t>
+            </a:r>
+            <a:endParaRPr/>
+          </a:p>
+          <a:p>
+            <a:endParaRPr/>
+          </a:p>
+        </p:txBody>
+      </p:sp>
+      <p:sp>
+        <p:nvSpPr>
+          <p:cNvPr id="71" name="CustomShape 3"/>
+          <p:cNvSpPr/>
+          <p:nvPr/>
+        </p:nvSpPr>
+        <p:spPr>
+          <a:xfrm>
+            <a:off x="7920000" y="1584000"/>
+            <a:ext cx="540000" cy="360000"/>
+          </a:xfrm>
+          <a:prstGeom prst="ellipse">
+            <a:avLst/>
+          </a:prstGeom>
+          <a:ln w="36000">
+            <a:solidFill>
+              <a:srgbClr val="00ff00"/>
+            </a:solidFill>
+            <a:round/>
+          </a:ln>
+        </p:spPr>
+      </p:sp>
+      <p:sp>
+        <p:nvSpPr>
+          <p:cNvPr id="72" name="TextShape 4"/>
+          <p:cNvSpPr txBox="1"/>
+          <p:nvPr/>
+        </p:nvSpPr>
+        <p:spPr>
+          <a:xfrm>
+            <a:off x="7344000" y="1440000"/>
+            <a:ext cx="840600" cy="346320"/>
+          </a:xfrm>
+          <a:prstGeom prst="rect">
+            <a:avLst/>
+          </a:prstGeom>
+        </p:spPr>
+        <p:txBody>
+          <a:bodyPr bIns="45000" lIns="90000" rIns="90000" tIns="45000" wrap="none"/>
+          <a:p>
+            <a:pPr algn="ctr"/>
+            <a:r>
+              <a:rPr lang="fi-FI"/>
+              <a:t>Export</a:t>
             </a:r>
             <a:endParaRPr/>
           </a:p>
@@ -3319,7 +2968,7 @@
       </p:sp>
       <p:pic>
         <p:nvPicPr>
-          <p:cNvPr descr="" id="82" name=""/>
+          <p:cNvPr descr="" id="73" name=""/>
           <p:cNvPicPr/>
           <p:nvPr/>
         </p:nvPicPr>
@@ -3331,8 +2980,8 @@
         </p:blipFill>
         <p:spPr>
           <a:xfrm>
-            <a:off x="6876000" y="4586400"/>
-            <a:ext cx="2091960" cy="2217600"/>
+            <a:off x="6440760" y="3060000"/>
+            <a:ext cx="1911240" cy="1288800"/>
           </a:xfrm>
           <a:prstGeom prst="rect">
             <a:avLst/>
@@ -3341,7 +2990,7 @@
       </p:pic>
       <p:pic>
         <p:nvPicPr>
-          <p:cNvPr descr="" id="83" name=""/>
+          <p:cNvPr descr="" id="74" name=""/>
           <p:cNvPicPr/>
           <p:nvPr/>
         </p:nvPicPr>
@@ -3353,45 +3002,45 @@
         </p:blipFill>
         <p:spPr>
           <a:xfrm>
-            <a:off x="8082720" y="3267720"/>
-            <a:ext cx="1637280" cy="1052280"/>
+            <a:off x="5499720" y="4680000"/>
+            <a:ext cx="1664280" cy="2222640"/>
           </a:xfrm>
           <a:prstGeom prst="rect">
             <a:avLst/>
           </a:prstGeom>
         </p:spPr>
       </p:pic>
-      <p:sp>
-        <p:nvSpPr>
-          <p:cNvPr id="84" name="CustomShape 4"/>
+      <p:pic>
+        <p:nvPicPr>
+          <p:cNvPr descr="" id="75" name=""/>
+          <p:cNvPicPr/>
+          <p:nvPr/>
+        </p:nvPicPr>
+        <p:blipFill>
+          <a:blip r:embed="rId3"/>
+          <a:stretch>
+            <a:fillRect/>
+          </a:stretch>
+        </p:blipFill>
+        <p:spPr>
+          <a:xfrm>
+            <a:off x="7740000" y="4698360"/>
+            <a:ext cx="1650600" cy="2204280"/>
+          </a:xfrm>
+          <a:prstGeom prst="rect">
+            <a:avLst/>
+          </a:prstGeom>
+        </p:spPr>
+      </p:pic>
+      <p:sp>
+        <p:nvSpPr>
+          <p:cNvPr id="76" name="Line 5"/>
           <p:cNvSpPr/>
           <p:nvPr/>
         </p:nvSpPr>
         <p:spPr>
           <a:xfrm>
-            <a:off x="8496000" y="1584000"/>
-            <a:ext cx="540000" cy="360000"/>
-          </a:xfrm>
-          <a:prstGeom prst="ellipse">
-            <a:avLst/>
-          </a:prstGeom>
-          <a:ln w="36000">
-            <a:solidFill>
-              <a:srgbClr val="00ff00"/>
-            </a:solidFill>
-            <a:round/>
-          </a:ln>
-        </p:spPr>
-      </p:sp>
-      <p:sp>
-        <p:nvSpPr>
-          <p:cNvPr id="85" name="Line 5"/>
-          <p:cNvSpPr/>
-          <p:nvPr/>
-        </p:nvSpPr>
-        <p:spPr>
-          <a:xfrm>
-            <a:off x="8820000" y="1980000"/>
+            <a:off x="8088840" y="1980000"/>
             <a:ext cx="0" cy="1260000"/>
           </a:xfrm>
           <a:prstGeom prst="line">
@@ -3407,14 +3056,41 @@
       </p:sp>
       <p:sp>
         <p:nvSpPr>
-          <p:cNvPr id="86" name="Line 6"/>
+          <p:cNvPr id="77" name="TextShape 6"/>
+          <p:cNvSpPr txBox="1"/>
+          <p:nvPr/>
+        </p:nvSpPr>
+        <p:spPr>
+          <a:xfrm>
+            <a:off x="7440840" y="3464640"/>
+            <a:ext cx="371160" cy="351360"/>
+          </a:xfrm>
+          <a:prstGeom prst="rect">
+            <a:avLst/>
+          </a:prstGeom>
+        </p:spPr>
+        <p:txBody>
+          <a:bodyPr bIns="45000" lIns="90000" rIns="90000" tIns="45000" wrap="none"/>
+          <a:p>
+            <a:pPr algn="ctr"/>
+            <a:r>
+              <a:rPr lang="fi-FI"/>
+              <a:t>1.</a:t>
+            </a:r>
+            <a:endParaRPr/>
+          </a:p>
+        </p:txBody>
+      </p:sp>
+      <p:sp>
+        <p:nvSpPr>
+          <p:cNvPr id="78" name="Line 7"/>
           <p:cNvSpPr/>
           <p:nvPr/>
         </p:nvSpPr>
         <p:spPr>
-          <a:xfrm flipH="1">
-            <a:off x="8460000" y="4320000"/>
-            <a:ext cx="360000" cy="360000"/>
+          <a:xfrm>
+            <a:off x="7920000" y="4140000"/>
+            <a:ext cx="180000" cy="540000"/>
           </a:xfrm>
           <a:prstGeom prst="line">
             <a:avLst/>
@@ -3429,14 +3105,41 @@
       </p:sp>
       <p:sp>
         <p:nvSpPr>
-          <p:cNvPr id="87" name="Line 7"/>
+          <p:cNvPr id="79" name="TextShape 8"/>
+          <p:cNvSpPr txBox="1"/>
+          <p:nvPr/>
+        </p:nvSpPr>
+        <p:spPr>
+          <a:xfrm>
+            <a:off x="7981200" y="5976000"/>
+            <a:ext cx="371160" cy="346320"/>
+          </a:xfrm>
+          <a:prstGeom prst="rect">
+            <a:avLst/>
+          </a:prstGeom>
+        </p:spPr>
+        <p:txBody>
+          <a:bodyPr bIns="45000" lIns="90000" rIns="90000" tIns="45000" wrap="none"/>
+          <a:p>
+            <a:pPr algn="ctr"/>
+            <a:r>
+              <a:rPr lang="fi-FI"/>
+              <a:t>2.</a:t>
+            </a:r>
+            <a:endParaRPr/>
+          </a:p>
+        </p:txBody>
+      </p:sp>
+      <p:sp>
+        <p:nvSpPr>
+          <p:cNvPr id="80" name="Line 9"/>
           <p:cNvSpPr/>
           <p:nvPr/>
         </p:nvSpPr>
         <p:spPr>
-          <a:xfrm>
-            <a:off x="6660000" y="2700000"/>
-            <a:ext cx="360000" cy="1800000"/>
+          <a:xfrm flipH="1">
+            <a:off x="6984000" y="6480000"/>
+            <a:ext cx="720000" cy="0"/>
           </a:xfrm>
           <a:prstGeom prst="line">
             <a:avLst/>
@@ -3451,14 +3154,14 @@
       </p:sp>
       <p:sp>
         <p:nvSpPr>
-          <p:cNvPr id="88" name="TextShape 8"/>
-          <p:cNvSpPr txBox="1"/>
-          <p:nvPr/>
-        </p:nvSpPr>
-        <p:spPr>
-          <a:xfrm>
-            <a:off x="9180000" y="2160000"/>
-            <a:ext cx="371160" cy="346320"/>
+          <p:cNvPr id="81" name="TextShape 10"/>
+          <p:cNvSpPr txBox="1"/>
+          <p:nvPr/>
+        </p:nvSpPr>
+        <p:spPr>
+          <a:xfrm>
+            <a:off x="6577560" y="5962320"/>
+            <a:ext cx="371160" cy="548640"/>
           </a:xfrm>
           <a:prstGeom prst="rect">
             <a:avLst/>
@@ -3470,146 +3173,7 @@
             <a:pPr algn="ctr"/>
             <a:r>
               <a:rPr lang="fi-FI"/>
-              <a:t>1.</a:t>
-            </a:r>
-            <a:endParaRPr/>
-          </a:p>
-        </p:txBody>
-      </p:sp>
-      <p:sp>
-        <p:nvSpPr>
-          <p:cNvPr id="89" name="TextShape 9"/>
-          <p:cNvSpPr txBox="1"/>
-          <p:nvPr/>
-        </p:nvSpPr>
-        <p:spPr>
-          <a:xfrm>
-            <a:off x="6300360" y="2880000"/>
-            <a:ext cx="371160" cy="346320"/>
-          </a:xfrm>
-          <a:prstGeom prst="rect">
-            <a:avLst/>
-          </a:prstGeom>
-        </p:spPr>
-        <p:txBody>
-          <a:bodyPr bIns="45000" lIns="90000" rIns="90000" tIns="45000" wrap="none"/>
-          <a:p>
-            <a:pPr algn="ctr"/>
-            <a:r>
-              <a:rPr lang="fi-FI"/>
-              <a:t>2.</a:t>
-            </a:r>
-            <a:endParaRPr/>
-          </a:p>
-        </p:txBody>
-      </p:sp>
-      <p:sp>
-        <p:nvSpPr>
-          <p:cNvPr id="90" name="TextShape 10"/>
-          <p:cNvSpPr txBox="1"/>
-          <p:nvPr/>
-        </p:nvSpPr>
-        <p:spPr>
-          <a:xfrm>
-            <a:off x="6840000" y="5760000"/>
-            <a:ext cx="1993680" cy="355680"/>
-          </a:xfrm>
-          <a:prstGeom prst="rect">
-            <a:avLst/>
-          </a:prstGeom>
-        </p:spPr>
-        <p:txBody>
-          <a:bodyPr bIns="45000" lIns="90000" rIns="90000" tIns="45000" wrap="none"/>
-          <a:p>
-            <a:pPr algn="ctr"/>
-            <a:r>
-              <a:rPr lang="fi-FI"/>
-              <a:t>Channel</a:t>
-            </a:r>
-            <a:r>
-              <a:rPr lang="fi-FI"/>
-              <a:t>選択画面</a:t>
-            </a:r>
-            <a:endParaRPr/>
-          </a:p>
-        </p:txBody>
-      </p:sp>
-      <p:sp>
-        <p:nvSpPr>
-          <p:cNvPr id="91" name="TextShape 11"/>
-          <p:cNvSpPr txBox="1"/>
-          <p:nvPr/>
-        </p:nvSpPr>
-        <p:spPr>
-          <a:xfrm>
-            <a:off x="7920000" y="3600000"/>
-            <a:ext cx="2009520" cy="355680"/>
-          </a:xfrm>
-          <a:prstGeom prst="rect">
-            <a:avLst/>
-          </a:prstGeom>
-        </p:spPr>
-        <p:txBody>
-          <a:bodyPr bIns="45000" lIns="90000" rIns="90000" tIns="45000" wrap="none"/>
-          <a:p>
-            <a:pPr algn="ctr"/>
-            <a:r>
-              <a:rPr lang="fi-FI"/>
-              <a:t>ファイル選択画面</a:t>
-            </a:r>
-            <a:endParaRPr/>
-          </a:p>
-        </p:txBody>
-      </p:sp>
-      <p:sp>
-        <p:nvSpPr>
-          <p:cNvPr id="92" name="TextShape 12"/>
-          <p:cNvSpPr txBox="1"/>
-          <p:nvPr/>
-        </p:nvSpPr>
-        <p:spPr>
-          <a:xfrm>
-            <a:off x="7920000" y="1440000"/>
-            <a:ext cx="828360" cy="346320"/>
-          </a:xfrm>
-          <a:prstGeom prst="rect">
-            <a:avLst/>
-          </a:prstGeom>
-        </p:spPr>
-        <p:txBody>
-          <a:bodyPr bIns="45000" lIns="90000" rIns="90000" tIns="45000" wrap="none"/>
-          <a:p>
-            <a:pPr algn="ctr"/>
-            <a:r>
-              <a:rPr lang="fi-FI"/>
-              <a:t>Import</a:t>
-            </a:r>
-            <a:endParaRPr/>
-          </a:p>
-        </p:txBody>
-      </p:sp>
-      <p:sp>
-        <p:nvSpPr>
-          <p:cNvPr id="93" name="TextShape 13"/>
-          <p:cNvSpPr txBox="1"/>
-          <p:nvPr/>
-        </p:nvSpPr>
-        <p:spPr>
-          <a:xfrm>
-            <a:off x="5400360" y="3240000"/>
-            <a:ext cx="2248920" cy="346320"/>
-          </a:xfrm>
-          <a:prstGeom prst="rect">
-            <a:avLst/>
-          </a:prstGeom>
-        </p:spPr>
-        <p:txBody>
-          <a:bodyPr bIns="45000" lIns="90000" rIns="90000" tIns="45000" wrap="none"/>
-          <a:p>
-            <a:pPr algn="ctr"/>
-            <a:r>
-              <a:rPr lang="fi-FI"/>
-              <a:t>Copy To Workspace</a:t>
+              <a:t>3.</a:t>
             </a:r>
             <a:endParaRPr/>
           </a:p>
@@ -3637,9 +3201,401 @@
           <a:chExt cx="0" cy="0"/>
         </a:xfrm>
       </p:grpSpPr>
+      <p:sp>
+        <p:nvSpPr>
+          <p:cNvPr id="82" name="TextShape 1"/>
+          <p:cNvSpPr txBox="1"/>
+          <p:nvPr/>
+        </p:nvSpPr>
+        <p:spPr>
+          <a:xfrm>
+            <a:off x="468360" y="0"/>
+            <a:ext cx="9071640" cy="1262520"/>
+          </a:xfrm>
+          <a:prstGeom prst="rect">
+            <a:avLst/>
+          </a:prstGeom>
+        </p:spPr>
+        <p:txBody>
+          <a:bodyPr anchor="ctr" bIns="0" lIns="0" rIns="0" tIns="0" wrap="none"/>
+          <a:p>
+            <a:pPr algn="ctr"/>
+            <a:r>
+              <a:rPr lang="fi-FI" sz="2200"/>
+              <a:t>モジュール別使用方法</a:t>
+            </a:r>
+            <a:endParaRPr/>
+          </a:p>
+        </p:txBody>
+      </p:sp>
+      <p:sp>
+        <p:nvSpPr>
+          <p:cNvPr id="83" name="TextShape 2"/>
+          <p:cNvSpPr txBox="1"/>
+          <p:nvPr/>
+        </p:nvSpPr>
+        <p:spPr>
+          <a:xfrm>
+            <a:off x="504000" y="1769040"/>
+            <a:ext cx="4426560" cy="4989600"/>
+          </a:xfrm>
+          <a:prstGeom prst="rect">
+            <a:avLst/>
+          </a:prstGeom>
+        </p:spPr>
+        <p:txBody>
+          <a:bodyPr bIns="0" lIns="0" rIns="0" tIns="0" wrap="none"/>
+          <a:p>
+            <a:pPr>
+              <a:buSzPct val="45000"/>
+              <a:buFont typeface="StarSymbol"/>
+              <a:buChar char=""/>
+            </a:pPr>
+            <a:r>
+              <a:rPr lang="fi-FI" sz="1400"/>
+              <a:t>Workspace</a:t>
+            </a:r>
+            <a:endParaRPr/>
+          </a:p>
+          <a:p>
+            <a:pPr lvl="1">
+              <a:buSzPct val="45000"/>
+              <a:buFont typeface="StarSymbol"/>
+              <a:buChar char=""/>
+            </a:pPr>
+            <a:r>
+              <a:rPr lang="fi-FI" sz="1400"/>
+              <a:t>Import</a:t>
+            </a:r>
+            <a:r>
+              <a:rPr lang="fi-FI" sz="1400"/>
+              <a:t>で</a:t>
+            </a:r>
+            <a:r>
+              <a:rPr lang="fi-FI" sz="1400"/>
+              <a:t>Channel</a:t>
+            </a:r>
+            <a:r>
+              <a:rPr lang="fi-FI" sz="1400"/>
+              <a:t>リストに</a:t>
+            </a:r>
+            <a:r>
+              <a:rPr lang="fi-FI" sz="1400"/>
+              <a:t>Channel</a:t>
+            </a:r>
+            <a:r>
+              <a:rPr lang="fi-FI" sz="1400"/>
+              <a:t>を追加します。</a:t>
+            </a:r>
+            <a:endParaRPr/>
+          </a:p>
+          <a:p>
+            <a:pPr lvl="1">
+              <a:buSzPct val="45000"/>
+              <a:buFont typeface="StarSymbol"/>
+              <a:buChar char=""/>
+            </a:pPr>
+            <a:r>
+              <a:rPr lang="fi-FI" sz="1400"/>
+              <a:t>尚、</a:t>
+            </a:r>
+            <a:r>
+              <a:rPr lang="fi-FI" sz="1400"/>
+              <a:t>Workspace</a:t>
+            </a:r>
+            <a:r>
+              <a:rPr lang="fi-FI" sz="1400"/>
+              <a:t>の</a:t>
+            </a:r>
+            <a:r>
+              <a:rPr lang="fi-FI" sz="1400"/>
+              <a:t>Channel</a:t>
+            </a:r>
+            <a:r>
+              <a:rPr lang="fi-FI" sz="1400"/>
+              <a:t>リストに</a:t>
+            </a:r>
+            <a:r>
+              <a:rPr lang="fi-FI" sz="1400"/>
+              <a:t>Channel</a:t>
+            </a:r>
+            <a:r>
+              <a:rPr lang="fi-FI" sz="1400"/>
+              <a:t>を追加する方法は、下記</a:t>
+            </a:r>
+            <a:r>
+              <a:rPr lang="fi-FI" sz="1400"/>
+              <a:t>2</a:t>
+            </a:r>
+            <a:r>
+              <a:rPr lang="fi-FI" sz="1400"/>
+              <a:t>通りあります</a:t>
+            </a:r>
+            <a:r>
+              <a:rPr lang="fi-FI" sz="1400"/>
+              <a:t>.</a:t>
+            </a:r>
+            <a:endParaRPr/>
+          </a:p>
+          <a:p>
+            <a:pPr lvl="2">
+              <a:buSzPct val="45000"/>
+              <a:buFont typeface="StarSymbol"/>
+              <a:buChar char=""/>
+            </a:pPr>
+            <a:r>
+              <a:rPr lang="fi-FI" sz="1100"/>
+              <a:t>1. Workspace</a:t>
+            </a:r>
+            <a:r>
+              <a:rPr lang="fi-FI" sz="1100"/>
+              <a:t>の</a:t>
+            </a:r>
+            <a:r>
+              <a:rPr lang="fi-FI" sz="1100"/>
+              <a:t>Import</a:t>
+            </a:r>
+            <a:r>
+              <a:rPr lang="fi-FI" sz="1100"/>
+              <a:t>をクリック、</a:t>
+            </a:r>
+            <a:r>
+              <a:rPr lang="fi-FI" sz="1100"/>
+              <a:t>Neuroshare</a:t>
+            </a:r>
+            <a:r>
+              <a:rPr lang="fi-FI" sz="1100"/>
+              <a:t>ファイル</a:t>
+            </a:r>
+            <a:r>
+              <a:rPr lang="fi-FI" sz="1100"/>
+              <a:t>(*1)</a:t>
+            </a:r>
+            <a:r>
+              <a:rPr lang="fi-FI" sz="1100"/>
+              <a:t>を選択した後、</a:t>
+            </a:r>
+            <a:r>
+              <a:rPr lang="fi-FI" sz="1100"/>
+              <a:t>Workspace</a:t>
+            </a:r>
+            <a:r>
+              <a:rPr lang="fi-FI" sz="1100"/>
+              <a:t>に追加する</a:t>
+            </a:r>
+            <a:r>
+              <a:rPr lang="fi-FI" sz="1100"/>
+              <a:t>Channel</a:t>
+            </a:r>
+            <a:r>
+              <a:rPr lang="fi-FI" sz="1100"/>
+              <a:t>を選択します。</a:t>
+            </a:r>
+            <a:endParaRPr/>
+          </a:p>
+          <a:p>
+            <a:pPr lvl="2">
+              <a:buSzPct val="45000"/>
+              <a:buFont typeface="StarSymbol"/>
+              <a:buChar char=""/>
+            </a:pPr>
+            <a:r>
+              <a:rPr lang="fi-FI" sz="1100"/>
+              <a:t>2. </a:t>
+            </a:r>
+            <a:r>
+              <a:rPr lang="fi-FI" sz="1100"/>
+              <a:t>エクスプローラー上で</a:t>
+            </a:r>
+            <a:r>
+              <a:rPr lang="fi-FI" sz="1100"/>
+              <a:t>Neuroshare</a:t>
+            </a:r>
+            <a:r>
+              <a:rPr lang="fi-FI" sz="1100"/>
+              <a:t>ファイル</a:t>
+            </a:r>
+            <a:r>
+              <a:rPr lang="fi-FI" sz="1100"/>
+              <a:t>(*1)</a:t>
+            </a:r>
+            <a:r>
+              <a:rPr lang="fi-FI" sz="1100"/>
+              <a:t>を選択し、右クリック → </a:t>
+            </a:r>
+            <a:r>
+              <a:rPr lang="fi-FI" sz="1100"/>
+              <a:t>Copy To Workspace </a:t>
+            </a:r>
+            <a:r>
+              <a:rPr lang="fi-FI" sz="1100"/>
+              <a:t>を押下した後、</a:t>
+            </a:r>
+            <a:r>
+              <a:rPr lang="fi-FI" sz="1100"/>
+              <a:t>Workspace</a:t>
+            </a:r>
+            <a:r>
+              <a:rPr lang="fi-FI" sz="1100"/>
+              <a:t>に追加する</a:t>
+            </a:r>
+            <a:r>
+              <a:rPr lang="fi-FI" sz="1100"/>
+              <a:t>Channel</a:t>
+            </a:r>
+            <a:r>
+              <a:rPr lang="fi-FI" sz="1100"/>
+              <a:t>を選択します。</a:t>
+            </a:r>
+            <a:endParaRPr/>
+          </a:p>
+          <a:p>
+            <a:endParaRPr/>
+          </a:p>
+        </p:txBody>
+      </p:sp>
+      <p:sp>
+        <p:nvSpPr>
+          <p:cNvPr id="84" name="TextShape 3"/>
+          <p:cNvSpPr txBox="1"/>
+          <p:nvPr/>
+        </p:nvSpPr>
+        <p:spPr>
+          <a:xfrm>
+            <a:off x="174960" y="6881040"/>
+            <a:ext cx="9041040" cy="626760"/>
+          </a:xfrm>
+          <a:prstGeom prst="rect">
+            <a:avLst/>
+          </a:prstGeom>
+        </p:spPr>
+        <p:txBody>
+          <a:bodyPr bIns="0" lIns="0" rIns="0" tIns="0" wrap="none"/>
+          <a:p>
+            <a:pPr>
+              <a:buSzPct val="45000"/>
+              <a:buFont typeface="StarSymbol"/>
+              <a:buChar char=""/>
+            </a:pPr>
+            <a:r>
+              <a:rPr lang="fi-FI" sz="1400">
+                <a:solidFill>
+                  <a:srgbClr val="ff420e"/>
+                </a:solidFill>
+              </a:rPr>
+              <a:t>(*1) : Neuroshare</a:t>
+            </a:r>
+            <a:r>
+              <a:rPr lang="fi-FI" sz="1400">
+                <a:solidFill>
+                  <a:srgbClr val="ff420e"/>
+                </a:solidFill>
+              </a:rPr>
+              <a:t>形式のみ許可されます。</a:t>
+            </a:r>
+            <a:r>
+              <a:rPr lang="fi-FI" sz="1400">
+                <a:solidFill>
+                  <a:srgbClr val="ff420e"/>
+                </a:solidFill>
+              </a:rPr>
+              <a:t>Neural</a:t>
+            </a:r>
+            <a:r>
+              <a:rPr lang="fi-FI" sz="1400">
+                <a:solidFill>
+                  <a:srgbClr val="ff420e"/>
+                </a:solidFill>
+              </a:rPr>
+              <a:t>データを含む他のデータフォーマット</a:t>
+            </a:r>
+            <a:r>
+              <a:rPr lang="fi-FI" sz="1400">
+                <a:solidFill>
+                  <a:srgbClr val="ff420e"/>
+                </a:solidFill>
+              </a:rPr>
+              <a:t>[.plx(Plexon), .nev, .nsx[x=1-9](BlackRock), .csv(ATRCSV)]</a:t>
+            </a:r>
+            <a:r>
+              <a:rPr lang="fi-FI" sz="1400">
+                <a:solidFill>
+                  <a:srgbClr val="ff420e"/>
+                </a:solidFill>
+              </a:rPr>
+              <a:t>の場合、</a:t>
+            </a:r>
+            <a:r>
+              <a:rPr lang="fi-FI" sz="1400">
+                <a:solidFill>
+                  <a:srgbClr val="ff420e"/>
+                </a:solidFill>
+              </a:rPr>
+              <a:t>Explorer</a:t>
+            </a:r>
+            <a:r>
+              <a:rPr lang="fi-FI" sz="1400">
+                <a:solidFill>
+                  <a:srgbClr val="ff420e"/>
+                </a:solidFill>
+              </a:rPr>
+              <a:t>の機能</a:t>
+            </a:r>
+            <a:r>
+              <a:rPr lang="fi-FI" sz="1400">
+                <a:solidFill>
+                  <a:srgbClr val="ff420e"/>
+                </a:solidFill>
+              </a:rPr>
+              <a:t>(Convert To Neuroshare)</a:t>
+            </a:r>
+            <a:r>
+              <a:rPr lang="fi-FI" sz="1400">
+                <a:solidFill>
+                  <a:srgbClr val="ff420e"/>
+                </a:solidFill>
+              </a:rPr>
+              <a:t>を使用して</a:t>
+            </a:r>
+            <a:r>
+              <a:rPr lang="fi-FI" sz="1400">
+                <a:solidFill>
+                  <a:srgbClr val="ff420e"/>
+                </a:solidFill>
+              </a:rPr>
+              <a:t>Neuroshare</a:t>
+            </a:r>
+            <a:r>
+              <a:rPr lang="fi-FI" sz="1400">
+                <a:solidFill>
+                  <a:srgbClr val="ff420e"/>
+                </a:solidFill>
+              </a:rPr>
+              <a:t>に変換後、</a:t>
+            </a:r>
+            <a:r>
+              <a:rPr lang="fi-FI" sz="1400">
+                <a:solidFill>
+                  <a:srgbClr val="ff420e"/>
+                </a:solidFill>
+              </a:rPr>
+              <a:t>Channel</a:t>
+            </a:r>
+            <a:r>
+              <a:rPr lang="fi-FI" sz="1400">
+                <a:solidFill>
+                  <a:srgbClr val="ff420e"/>
+                </a:solidFill>
+              </a:rPr>
+              <a:t>を追加してください。</a:t>
+            </a:r>
+            <a:endParaRPr/>
+          </a:p>
+        </p:txBody>
+      </p:sp>
       <p:pic>
         <p:nvPicPr>
-          <p:cNvPr descr="" id="94" name=""/>
+          <p:cNvPr descr="" id="85" name=""/>
           <p:cNvPicPr/>
           <p:nvPr/>
         </p:nvPicPr>
@@ -3651,248 +3607,17 @@
         </p:blipFill>
         <p:spPr>
           <a:xfrm>
-            <a:off x="6012000" y="1404000"/>
-            <a:ext cx="3192120" cy="2559600"/>
+            <a:off x="6876000" y="4586400"/>
+            <a:ext cx="2091960" cy="2217600"/>
           </a:xfrm>
           <a:prstGeom prst="rect">
             <a:avLst/>
           </a:prstGeom>
         </p:spPr>
       </p:pic>
-      <p:sp>
-        <p:nvSpPr>
-          <p:cNvPr id="95" name="TextShape 1"/>
-          <p:cNvSpPr txBox="1"/>
-          <p:nvPr/>
-        </p:nvSpPr>
-        <p:spPr>
-          <a:xfrm>
-            <a:off x="468360" y="0"/>
-            <a:ext cx="9071640" cy="1262520"/>
-          </a:xfrm>
-          <a:prstGeom prst="rect">
-            <a:avLst/>
-          </a:prstGeom>
-        </p:spPr>
-        <p:txBody>
-          <a:bodyPr anchor="ctr" bIns="0" lIns="0" rIns="0" tIns="0" wrap="none"/>
-          <a:p>
-            <a:pPr algn="ctr"/>
-            <a:r>
-              <a:rPr lang="fi-FI" sz="2200"/>
-              <a:t>モジュール別使用方法</a:t>
-            </a:r>
-            <a:endParaRPr/>
-          </a:p>
-        </p:txBody>
-      </p:sp>
-      <p:sp>
-        <p:nvSpPr>
-          <p:cNvPr id="96" name="TextShape 2"/>
-          <p:cNvSpPr txBox="1"/>
-          <p:nvPr/>
-        </p:nvSpPr>
-        <p:spPr>
-          <a:xfrm>
-            <a:off x="504000" y="1769040"/>
-            <a:ext cx="4426560" cy="4989600"/>
-          </a:xfrm>
-          <a:prstGeom prst="rect">
-            <a:avLst/>
-          </a:prstGeom>
-        </p:spPr>
-        <p:txBody>
-          <a:bodyPr bIns="0" lIns="0" rIns="0" tIns="0" wrap="none"/>
-          <a:p>
-            <a:pPr>
-              <a:buSzPct val="45000"/>
-              <a:buFont typeface="StarSymbol"/>
-              <a:buChar char=""/>
-            </a:pPr>
-            <a:r>
-              <a:rPr lang="fi-FI" sz="1400"/>
-              <a:t>Workspace</a:t>
-            </a:r>
-            <a:endParaRPr/>
-          </a:p>
-          <a:p>
-            <a:pPr lvl="1">
-              <a:buSzPct val="45000"/>
-              <a:buFont typeface="StarSymbol"/>
-              <a:buChar char=""/>
-            </a:pPr>
-            <a:r>
-              <a:rPr lang="fi-FI" sz="1400"/>
-              <a:t>Show Properties</a:t>
-            </a:r>
-            <a:r>
-              <a:rPr lang="fi-FI" sz="1400"/>
-              <a:t>で</a:t>
-            </a:r>
-            <a:r>
-              <a:rPr lang="fi-FI" sz="1400"/>
-              <a:t>Channel</a:t>
-            </a:r>
-            <a:r>
-              <a:rPr lang="fi-FI" sz="1400"/>
-              <a:t>のヘッダ情報を更新します。</a:t>
-            </a:r>
-            <a:endParaRPr/>
-          </a:p>
-          <a:p>
-            <a:pPr lvl="1">
-              <a:buSzPct val="45000"/>
-              <a:buFont typeface="StarSymbol"/>
-              <a:buChar char=""/>
-            </a:pPr>
-            <a:r>
-              <a:rPr lang="fi-FI" sz="1400"/>
-              <a:t>Channel</a:t>
-            </a:r>
-            <a:r>
-              <a:rPr lang="fi-FI" sz="1400"/>
-              <a:t>を一つ選択し、</a:t>
-            </a:r>
-            <a:r>
-              <a:rPr lang="fi-FI" sz="1400"/>
-              <a:t>Show Property</a:t>
-            </a:r>
-            <a:r>
-              <a:rPr lang="fi-FI" sz="1400"/>
-              <a:t>を押下します。</a:t>
-            </a:r>
-            <a:r>
-              <a:rPr lang="fi-FI" sz="1400"/>
-              <a:t>Channel Editor</a:t>
-            </a:r>
-            <a:r>
-              <a:rPr lang="fi-FI" sz="1400"/>
-              <a:t>画面が表示されるので、適宜編集し</a:t>
-            </a:r>
-            <a:r>
-              <a:rPr lang="fi-FI" sz="1400"/>
-              <a:t>OK</a:t>
-            </a:r>
-            <a:r>
-              <a:rPr lang="fi-FI" sz="1400"/>
-              <a:t>を押下することで、</a:t>
-            </a:r>
-            <a:r>
-              <a:rPr lang="fi-FI" sz="1400"/>
-              <a:t>Channel</a:t>
-            </a:r>
-            <a:r>
-              <a:rPr lang="fi-FI" sz="1400"/>
-              <a:t>のヘッダ情報を更新します。</a:t>
-            </a:r>
-            <a:endParaRPr/>
-          </a:p>
-          <a:p>
-            <a:endParaRPr/>
-          </a:p>
-        </p:txBody>
-      </p:sp>
-      <p:sp>
-        <p:nvSpPr>
-          <p:cNvPr id="97" name="CustomShape 3"/>
-          <p:cNvSpPr/>
-          <p:nvPr/>
-        </p:nvSpPr>
-        <p:spPr>
-          <a:xfrm>
-            <a:off x="8496000" y="1584000"/>
-            <a:ext cx="540000" cy="360000"/>
-          </a:xfrm>
-          <a:prstGeom prst="ellipse">
-            <a:avLst/>
-          </a:prstGeom>
-          <a:ln w="36000">
-            <a:solidFill>
-              <a:srgbClr val="00ff00"/>
-            </a:solidFill>
-            <a:round/>
-          </a:ln>
-        </p:spPr>
-      </p:sp>
-      <p:sp>
-        <p:nvSpPr>
-          <p:cNvPr id="98" name="Line 4"/>
-          <p:cNvSpPr/>
-          <p:nvPr/>
-        </p:nvSpPr>
-        <p:spPr>
-          <a:xfrm flipH="1">
-            <a:off x="8100000" y="1980000"/>
-            <a:ext cx="720000" cy="2340000"/>
-          </a:xfrm>
-          <a:prstGeom prst="line">
-            <a:avLst/>
-          </a:prstGeom>
-          <a:ln>
-            <a:solidFill>
-              <a:srgbClr val="000000"/>
-            </a:solidFill>
-            <a:tailEnd len="med" type="triangle" w="med"/>
-          </a:ln>
-        </p:spPr>
-      </p:sp>
-      <p:sp>
-        <p:nvSpPr>
-          <p:cNvPr id="99" name="TextShape 5"/>
-          <p:cNvSpPr txBox="1"/>
-          <p:nvPr/>
-        </p:nvSpPr>
-        <p:spPr>
-          <a:xfrm>
-            <a:off x="9180000" y="2160000"/>
-            <a:ext cx="371160" cy="346320"/>
-          </a:xfrm>
-          <a:prstGeom prst="rect">
-            <a:avLst/>
-          </a:prstGeom>
-        </p:spPr>
-        <p:txBody>
-          <a:bodyPr bIns="45000" lIns="90000" rIns="90000" tIns="45000" wrap="none"/>
-          <a:p>
-            <a:pPr algn="ctr"/>
-            <a:r>
-              <a:rPr lang="fi-FI"/>
-              <a:t>1.</a:t>
-            </a:r>
-            <a:endParaRPr/>
-          </a:p>
-        </p:txBody>
-      </p:sp>
-      <p:sp>
-        <p:nvSpPr>
-          <p:cNvPr id="100" name="TextShape 6"/>
-          <p:cNvSpPr txBox="1"/>
-          <p:nvPr/>
-        </p:nvSpPr>
-        <p:spPr>
-          <a:xfrm>
-            <a:off x="7920000" y="1440000"/>
-            <a:ext cx="1854000" cy="346320"/>
-          </a:xfrm>
-          <a:prstGeom prst="rect">
-            <a:avLst/>
-          </a:prstGeom>
-        </p:spPr>
-        <p:txBody>
-          <a:bodyPr bIns="45000" lIns="90000" rIns="90000" tIns="45000" wrap="none"/>
-          <a:p>
-            <a:pPr algn="ctr"/>
-            <a:r>
-              <a:rPr lang="fi-FI"/>
-              <a:t>Show Properties</a:t>
-            </a:r>
-            <a:endParaRPr/>
-          </a:p>
-        </p:txBody>
-      </p:sp>
       <p:pic>
         <p:nvPicPr>
-          <p:cNvPr descr="" id="101" name=""/>
+          <p:cNvPr descr="" id="86" name=""/>
           <p:cNvPicPr/>
           <p:nvPr/>
         </p:nvPicPr>
@@ -3904,14 +3629,268 @@
         </p:blipFill>
         <p:spPr>
           <a:xfrm>
-            <a:off x="6796800" y="4369680"/>
-            <a:ext cx="1843200" cy="2110320"/>
+            <a:off x="8082720" y="3267720"/>
+            <a:ext cx="1637280" cy="1052280"/>
           </a:xfrm>
           <a:prstGeom prst="rect">
             <a:avLst/>
           </a:prstGeom>
         </p:spPr>
       </p:pic>
+      <p:sp>
+        <p:nvSpPr>
+          <p:cNvPr id="87" name="CustomShape 4"/>
+          <p:cNvSpPr/>
+          <p:nvPr/>
+        </p:nvSpPr>
+        <p:spPr>
+          <a:xfrm>
+            <a:off x="8496000" y="1584000"/>
+            <a:ext cx="540000" cy="360000"/>
+          </a:xfrm>
+          <a:prstGeom prst="ellipse">
+            <a:avLst/>
+          </a:prstGeom>
+          <a:ln w="36000">
+            <a:solidFill>
+              <a:srgbClr val="00ff00"/>
+            </a:solidFill>
+            <a:round/>
+          </a:ln>
+        </p:spPr>
+      </p:sp>
+      <p:sp>
+        <p:nvSpPr>
+          <p:cNvPr id="88" name="Line 5"/>
+          <p:cNvSpPr/>
+          <p:nvPr/>
+        </p:nvSpPr>
+        <p:spPr>
+          <a:xfrm>
+            <a:off x="8820000" y="1980000"/>
+            <a:ext cx="0" cy="1260000"/>
+          </a:xfrm>
+          <a:prstGeom prst="line">
+            <a:avLst/>
+          </a:prstGeom>
+          <a:ln>
+            <a:solidFill>
+              <a:srgbClr val="000000"/>
+            </a:solidFill>
+            <a:tailEnd len="med" type="triangle" w="med"/>
+          </a:ln>
+        </p:spPr>
+      </p:sp>
+      <p:sp>
+        <p:nvSpPr>
+          <p:cNvPr id="89" name="Line 6"/>
+          <p:cNvSpPr/>
+          <p:nvPr/>
+        </p:nvSpPr>
+        <p:spPr>
+          <a:xfrm flipH="1">
+            <a:off x="8460000" y="4320000"/>
+            <a:ext cx="360000" cy="360000"/>
+          </a:xfrm>
+          <a:prstGeom prst="line">
+            <a:avLst/>
+          </a:prstGeom>
+          <a:ln>
+            <a:solidFill>
+              <a:srgbClr val="000000"/>
+            </a:solidFill>
+            <a:tailEnd len="med" type="triangle" w="med"/>
+          </a:ln>
+        </p:spPr>
+      </p:sp>
+      <p:sp>
+        <p:nvSpPr>
+          <p:cNvPr id="90" name="Line 7"/>
+          <p:cNvSpPr/>
+          <p:nvPr/>
+        </p:nvSpPr>
+        <p:spPr>
+          <a:xfrm>
+            <a:off x="6660000" y="2700000"/>
+            <a:ext cx="360000" cy="1800000"/>
+          </a:xfrm>
+          <a:prstGeom prst="line">
+            <a:avLst/>
+          </a:prstGeom>
+          <a:ln>
+            <a:solidFill>
+              <a:srgbClr val="000000"/>
+            </a:solidFill>
+            <a:tailEnd len="med" type="triangle" w="med"/>
+          </a:ln>
+        </p:spPr>
+      </p:sp>
+      <p:sp>
+        <p:nvSpPr>
+          <p:cNvPr id="91" name="TextShape 8"/>
+          <p:cNvSpPr txBox="1"/>
+          <p:nvPr/>
+        </p:nvSpPr>
+        <p:spPr>
+          <a:xfrm>
+            <a:off x="9180000" y="2160000"/>
+            <a:ext cx="371160" cy="346320"/>
+          </a:xfrm>
+          <a:prstGeom prst="rect">
+            <a:avLst/>
+          </a:prstGeom>
+        </p:spPr>
+        <p:txBody>
+          <a:bodyPr bIns="45000" lIns="90000" rIns="90000" tIns="45000" wrap="none"/>
+          <a:p>
+            <a:pPr algn="ctr"/>
+            <a:r>
+              <a:rPr lang="fi-FI"/>
+              <a:t>1.</a:t>
+            </a:r>
+            <a:endParaRPr/>
+          </a:p>
+        </p:txBody>
+      </p:sp>
+      <p:sp>
+        <p:nvSpPr>
+          <p:cNvPr id="92" name="TextShape 9"/>
+          <p:cNvSpPr txBox="1"/>
+          <p:nvPr/>
+        </p:nvSpPr>
+        <p:spPr>
+          <a:xfrm>
+            <a:off x="6300360" y="2880000"/>
+            <a:ext cx="371160" cy="346320"/>
+          </a:xfrm>
+          <a:prstGeom prst="rect">
+            <a:avLst/>
+          </a:prstGeom>
+        </p:spPr>
+        <p:txBody>
+          <a:bodyPr bIns="45000" lIns="90000" rIns="90000" tIns="45000" wrap="none"/>
+          <a:p>
+            <a:pPr algn="ctr"/>
+            <a:r>
+              <a:rPr lang="fi-FI"/>
+              <a:t>2.</a:t>
+            </a:r>
+            <a:endParaRPr/>
+          </a:p>
+        </p:txBody>
+      </p:sp>
+      <p:sp>
+        <p:nvSpPr>
+          <p:cNvPr id="93" name="TextShape 10"/>
+          <p:cNvSpPr txBox="1"/>
+          <p:nvPr/>
+        </p:nvSpPr>
+        <p:spPr>
+          <a:xfrm>
+            <a:off x="6840000" y="5760000"/>
+            <a:ext cx="1993680" cy="355680"/>
+          </a:xfrm>
+          <a:prstGeom prst="rect">
+            <a:avLst/>
+          </a:prstGeom>
+        </p:spPr>
+        <p:txBody>
+          <a:bodyPr bIns="45000" lIns="90000" rIns="90000" tIns="45000" wrap="none"/>
+          <a:p>
+            <a:pPr algn="ctr"/>
+            <a:r>
+              <a:rPr lang="fi-FI"/>
+              <a:t>Channel</a:t>
+            </a:r>
+            <a:r>
+              <a:rPr lang="fi-FI"/>
+              <a:t>選択画面</a:t>
+            </a:r>
+            <a:endParaRPr/>
+          </a:p>
+        </p:txBody>
+      </p:sp>
+      <p:sp>
+        <p:nvSpPr>
+          <p:cNvPr id="94" name="TextShape 11"/>
+          <p:cNvSpPr txBox="1"/>
+          <p:nvPr/>
+        </p:nvSpPr>
+        <p:spPr>
+          <a:xfrm>
+            <a:off x="7920000" y="3600000"/>
+            <a:ext cx="2009520" cy="355680"/>
+          </a:xfrm>
+          <a:prstGeom prst="rect">
+            <a:avLst/>
+          </a:prstGeom>
+        </p:spPr>
+        <p:txBody>
+          <a:bodyPr bIns="45000" lIns="90000" rIns="90000" tIns="45000" wrap="none"/>
+          <a:p>
+            <a:pPr algn="ctr"/>
+            <a:r>
+              <a:rPr lang="fi-FI"/>
+              <a:t>ファイル選択画面</a:t>
+            </a:r>
+            <a:endParaRPr/>
+          </a:p>
+        </p:txBody>
+      </p:sp>
+      <p:sp>
+        <p:nvSpPr>
+          <p:cNvPr id="95" name="TextShape 12"/>
+          <p:cNvSpPr txBox="1"/>
+          <p:nvPr/>
+        </p:nvSpPr>
+        <p:spPr>
+          <a:xfrm>
+            <a:off x="7920000" y="1440000"/>
+            <a:ext cx="828360" cy="346320"/>
+          </a:xfrm>
+          <a:prstGeom prst="rect">
+            <a:avLst/>
+          </a:prstGeom>
+        </p:spPr>
+        <p:txBody>
+          <a:bodyPr bIns="45000" lIns="90000" rIns="90000" tIns="45000" wrap="none"/>
+          <a:p>
+            <a:pPr algn="ctr"/>
+            <a:r>
+              <a:rPr lang="fi-FI"/>
+              <a:t>Import</a:t>
+            </a:r>
+            <a:endParaRPr/>
+          </a:p>
+        </p:txBody>
+      </p:sp>
+      <p:sp>
+        <p:nvSpPr>
+          <p:cNvPr id="96" name="TextShape 13"/>
+          <p:cNvSpPr txBox="1"/>
+          <p:nvPr/>
+        </p:nvSpPr>
+        <p:spPr>
+          <a:xfrm>
+            <a:off x="5400360" y="3240000"/>
+            <a:ext cx="2248920" cy="346320"/>
+          </a:xfrm>
+          <a:prstGeom prst="rect">
+            <a:avLst/>
+          </a:prstGeom>
+        </p:spPr>
+        <p:txBody>
+          <a:bodyPr bIns="45000" lIns="90000" rIns="90000" tIns="45000" wrap="none"/>
+          <a:p>
+            <a:pPr algn="ctr"/>
+            <a:r>
+              <a:rPr lang="fi-FI"/>
+              <a:t>Copy To Workspace</a:t>
+            </a:r>
+            <a:endParaRPr/>
+          </a:p>
+        </p:txBody>
+      </p:sp>
     </p:spTree>
   </p:cSld>
 </p:sld>
@@ -3934,9 +3913,31 @@
           <a:chExt cx="0" cy="0"/>
         </a:xfrm>
       </p:grpSpPr>
-      <p:sp>
-        <p:nvSpPr>
-          <p:cNvPr id="102" name="TextShape 1"/>
+      <p:pic>
+        <p:nvPicPr>
+          <p:cNvPr descr="" id="97" name=""/>
+          <p:cNvPicPr/>
+          <p:nvPr/>
+        </p:nvPicPr>
+        <p:blipFill>
+          <a:blip r:embed="rId1"/>
+          <a:stretch>
+            <a:fillRect/>
+          </a:stretch>
+        </p:blipFill>
+        <p:spPr>
+          <a:xfrm>
+            <a:off x="6012000" y="1404000"/>
+            <a:ext cx="3192120" cy="2559600"/>
+          </a:xfrm>
+          <a:prstGeom prst="rect">
+            <a:avLst/>
+          </a:prstGeom>
+        </p:spPr>
+      </p:pic>
+      <p:sp>
+        <p:nvSpPr>
+          <p:cNvPr id="98" name="TextShape 1"/>
           <p:cNvSpPr txBox="1"/>
           <p:nvPr/>
         </p:nvSpPr>
@@ -3963,7 +3964,7 @@
       </p:sp>
       <p:sp>
         <p:nvSpPr>
-          <p:cNvPr id="103" name="TextShape 2"/>
+          <p:cNvPr id="99" name="TextShape 2"/>
           <p:cNvSpPr txBox="1"/>
           <p:nvPr/>
         </p:nvSpPr>
@@ -3986,7 +3987,7 @@
             </a:pPr>
             <a:r>
               <a:rPr lang="fi-FI" sz="1400"/>
-              <a:t>timeline</a:t>
+              <a:t>Workspace</a:t>
             </a:r>
             <a:endParaRPr/>
           </a:p>
@@ -3998,11 +3999,11 @@
             </a:pPr>
             <a:r>
               <a:rPr lang="fi-FI" sz="1400"/>
-              <a:t>Workspace</a:t>
-            </a:r>
-            <a:r>
-              <a:rPr lang="fi-FI" sz="1400"/>
-              <a:t>にある</a:t>
+              <a:t>Show Properties</a:t>
+            </a:r>
+            <a:r>
+              <a:rPr lang="fi-FI" sz="1400"/>
+              <a:t>で</a:t>
             </a:r>
             <a:r>
               <a:rPr lang="fi-FI" sz="1400"/>
@@ -4010,7 +4011,7 @@
             </a:r>
             <a:r>
               <a:rPr lang="fi-FI" sz="1400"/>
-              <a:t>形式のデータをグラフで表示します。</a:t>
+              <a:t>のヘッダ情報を更新します。</a:t>
             </a:r>
             <a:endParaRPr/>
           </a:p>
@@ -4022,19 +4023,35 @@
             </a:pPr>
             <a:r>
               <a:rPr lang="fi-FI" sz="1400"/>
-              <a:t>Workspace</a:t>
-            </a:r>
-            <a:r>
-              <a:rPr lang="fi-FI" sz="1400"/>
-              <a:t>にある</a:t>
-            </a:r>
-            <a:r>
-              <a:rPr lang="fi-FI" sz="1400"/>
               <a:t>Channel</a:t>
             </a:r>
             <a:r>
               <a:rPr lang="fi-FI" sz="1400"/>
-              <a:t>を表示するため、事前に</a:t>
+              <a:t>を一つ選択し、</a:t>
+            </a:r>
+            <a:r>
+              <a:rPr lang="fi-FI" sz="1400"/>
+              <a:t>Show Property</a:t>
+            </a:r>
+            <a:r>
+              <a:rPr lang="fi-FI" sz="1400"/>
+              <a:t>を押下します。</a:t>
+            </a:r>
+            <a:r>
+              <a:rPr lang="fi-FI" sz="1400"/>
+              <a:t>Channel Editor</a:t>
+            </a:r>
+            <a:r>
+              <a:rPr lang="fi-FI" sz="1400"/>
+              <a:t>画面が表示されるので、適宜編集し</a:t>
+            </a:r>
+            <a:r>
+              <a:rPr lang="fi-FI" sz="1400"/>
+              <a:t>OK</a:t>
+            </a:r>
+            <a:r>
+              <a:rPr lang="fi-FI" sz="1400"/>
+              <a:t>を押下することで、</a:t>
             </a:r>
             <a:r>
               <a:rPr lang="fi-FI" sz="1400"/>
@@ -4042,83 +4059,135 @@
             </a:r>
             <a:r>
               <a:rPr lang="fi-FI" sz="1400"/>
-              <a:t>を登録してください。</a:t>
-            </a:r>
-            <a:r>
-              <a:rPr lang="fi-FI" sz="1400"/>
-              <a:t>
-</a:t>
-            </a:r>
-            <a:r>
-              <a:rPr lang="fi-FI" sz="1400"/>
-              <a:t>(</a:t>
-            </a:r>
-            <a:r>
-              <a:rPr lang="fi-FI" sz="1400"/>
-              <a:t>登録方法は</a:t>
-            </a:r>
-            <a:r>
-              <a:rPr lang="fi-FI" sz="1400"/>
-              <a:t>Workspace</a:t>
-            </a:r>
-            <a:r>
-              <a:rPr lang="fi-FI" sz="1400"/>
-              <a:t>の項目を参照願います</a:t>
-            </a:r>
-            <a:r>
-              <a:rPr lang="fi-FI" sz="1400"/>
-              <a:t>)</a:t>
-            </a:r>
-            <a:endParaRPr/>
-          </a:p>
-          <a:p>
-            <a:pPr lvl="1">
-              <a:buSzPct val="45000"/>
-              <a:buFont typeface="StarSymbol"/>
-              <a:buChar char=""/>
-            </a:pPr>
-            <a:r>
-              <a:rPr lang="fi-FI" sz="1400"/>
-              <a:t>Workspace</a:t>
-            </a:r>
-            <a:r>
-              <a:rPr lang="fi-FI" sz="1400"/>
-              <a:t>に</a:t>
-            </a:r>
-            <a:r>
-              <a:rPr lang="fi-FI" sz="1400"/>
-              <a:t>Channel</a:t>
-            </a:r>
-            <a:r>
-              <a:rPr lang="fi-FI" sz="1400"/>
-              <a:t>を登録すると、</a:t>
-            </a:r>
-            <a:r>
-              <a:rPr lang="fi-FI" sz="1400"/>
-              <a:t>Analog</a:t>
-            </a:r>
-            <a:r>
-              <a:rPr lang="fi-FI" sz="1400"/>
-              <a:t>型の</a:t>
-            </a:r>
-            <a:r>
-              <a:rPr lang="fi-FI" sz="1400"/>
-              <a:t>Channel</a:t>
-            </a:r>
-            <a:r>
-              <a:rPr lang="fi-FI" sz="1400"/>
-              <a:t>のデータがグラフにプロットされます。</a:t>
-            </a:r>
-            <a:endParaRPr/>
-          </a:p>
-          <a:p>
-            <a:endParaRPr/>
-          </a:p>
-          <a:p>
-            <a:endParaRPr/>
-          </a:p>
-        </p:txBody>
-      </p:sp>
+              <a:t>のヘッダ情報を更新します。</a:t>
+            </a:r>
+            <a:endParaRPr/>
+          </a:p>
+          <a:p>
+            <a:endParaRPr/>
+          </a:p>
+        </p:txBody>
+      </p:sp>
+      <p:sp>
+        <p:nvSpPr>
+          <p:cNvPr id="100" name="CustomShape 3"/>
+          <p:cNvSpPr/>
+          <p:nvPr/>
+        </p:nvSpPr>
+        <p:spPr>
+          <a:xfrm>
+            <a:off x="8496000" y="1584000"/>
+            <a:ext cx="540000" cy="360000"/>
+          </a:xfrm>
+          <a:prstGeom prst="ellipse">
+            <a:avLst/>
+          </a:prstGeom>
+          <a:ln w="36000">
+            <a:solidFill>
+              <a:srgbClr val="00ff00"/>
+            </a:solidFill>
+            <a:round/>
+          </a:ln>
+        </p:spPr>
+      </p:sp>
+      <p:sp>
+        <p:nvSpPr>
+          <p:cNvPr id="101" name="Line 4"/>
+          <p:cNvSpPr/>
+          <p:nvPr/>
+        </p:nvSpPr>
+        <p:spPr>
+          <a:xfrm flipH="1">
+            <a:off x="8100000" y="1980000"/>
+            <a:ext cx="720000" cy="2340000"/>
+          </a:xfrm>
+          <a:prstGeom prst="line">
+            <a:avLst/>
+          </a:prstGeom>
+          <a:ln>
+            <a:solidFill>
+              <a:srgbClr val="000000"/>
+            </a:solidFill>
+            <a:tailEnd len="med" type="triangle" w="med"/>
+          </a:ln>
+        </p:spPr>
+      </p:sp>
+      <p:sp>
+        <p:nvSpPr>
+          <p:cNvPr id="102" name="TextShape 5"/>
+          <p:cNvSpPr txBox="1"/>
+          <p:nvPr/>
+        </p:nvSpPr>
+        <p:spPr>
+          <a:xfrm>
+            <a:off x="9180000" y="2160000"/>
+            <a:ext cx="371160" cy="346320"/>
+          </a:xfrm>
+          <a:prstGeom prst="rect">
+            <a:avLst/>
+          </a:prstGeom>
+        </p:spPr>
+        <p:txBody>
+          <a:bodyPr bIns="45000" lIns="90000" rIns="90000" tIns="45000" wrap="none"/>
+          <a:p>
+            <a:pPr algn="ctr"/>
+            <a:r>
+              <a:rPr lang="fi-FI"/>
+              <a:t>1.</a:t>
+            </a:r>
+            <a:endParaRPr/>
+          </a:p>
+        </p:txBody>
+      </p:sp>
+      <p:sp>
+        <p:nvSpPr>
+          <p:cNvPr id="103" name="TextShape 6"/>
+          <p:cNvSpPr txBox="1"/>
+          <p:nvPr/>
+        </p:nvSpPr>
+        <p:spPr>
+          <a:xfrm>
+            <a:off x="7920000" y="1440000"/>
+            <a:ext cx="1854000" cy="346320"/>
+          </a:xfrm>
+          <a:prstGeom prst="rect">
+            <a:avLst/>
+          </a:prstGeom>
+        </p:spPr>
+        <p:txBody>
+          <a:bodyPr bIns="45000" lIns="90000" rIns="90000" tIns="45000" wrap="none"/>
+          <a:p>
+            <a:pPr algn="ctr"/>
+            <a:r>
+              <a:rPr lang="fi-FI"/>
+              <a:t>Show Properties</a:t>
+            </a:r>
+            <a:endParaRPr/>
+          </a:p>
+        </p:txBody>
+      </p:sp>
+      <p:pic>
+        <p:nvPicPr>
+          <p:cNvPr descr="" id="104" name=""/>
+          <p:cNvPicPr/>
+          <p:nvPr/>
+        </p:nvPicPr>
+        <p:blipFill>
+          <a:blip r:embed="rId2"/>
+          <a:stretch>
+            <a:fillRect/>
+          </a:stretch>
+        </p:blipFill>
+        <p:spPr>
+          <a:xfrm>
+            <a:off x="6796800" y="4369680"/>
+            <a:ext cx="1843200" cy="2110320"/>
+          </a:xfrm>
+          <a:prstGeom prst="rect">
+            <a:avLst/>
+          </a:prstGeom>
+        </p:spPr>
+      </p:pic>
     </p:spTree>
   </p:cSld>
 </p:sld>
@@ -4143,7 +4212,7 @@
       </p:grpSpPr>
       <p:sp>
         <p:nvSpPr>
-          <p:cNvPr id="104" name="TextShape 1"/>
+          <p:cNvPr id="105" name="TextShape 1"/>
           <p:cNvSpPr txBox="1"/>
           <p:nvPr/>
         </p:nvSpPr>
@@ -4162,22 +4231,22 @@
             <a:pPr algn="ctr"/>
             <a:r>
               <a:rPr lang="fi-FI" sz="2200"/>
-              <a:t>補足事項</a:t>
-            </a:r>
-            <a:endParaRPr/>
-          </a:p>
-        </p:txBody>
-      </p:sp>
-      <p:sp>
-        <p:nvSpPr>
-          <p:cNvPr id="105" name="TextShape 2"/>
+              <a:t>モジュール別使用方法</a:t>
+            </a:r>
+            <a:endParaRPr/>
+          </a:p>
+        </p:txBody>
+      </p:sp>
+      <p:sp>
+        <p:nvSpPr>
+          <p:cNvPr id="106" name="TextShape 2"/>
           <p:cNvSpPr txBox="1"/>
           <p:nvPr/>
         </p:nvSpPr>
         <p:spPr>
           <a:xfrm>
             <a:off x="504000" y="1769040"/>
-            <a:ext cx="9071640" cy="4989600"/>
+            <a:ext cx="4426560" cy="4989600"/>
           </a:xfrm>
           <a:prstGeom prst="rect">
             <a:avLst/>
@@ -4193,11 +4262,31 @@
             </a:pPr>
             <a:r>
               <a:rPr lang="fi-FI" sz="1400"/>
+              <a:t>timeline</a:t>
+            </a:r>
+            <a:endParaRPr/>
+          </a:p>
+          <a:p>
+            <a:pPr lvl="1">
+              <a:buSzPct val="45000"/>
+              <a:buFont typeface="StarSymbol"/>
+              <a:buChar char=""/>
+            </a:pPr>
+            <a:r>
+              <a:rPr lang="fi-FI" sz="1400"/>
+              <a:t>Workspace</a:t>
+            </a:r>
+            <a:r>
+              <a:rPr lang="fi-FI" sz="1400"/>
+              <a:t>にある</a:t>
+            </a:r>
+            <a:r>
+              <a:rPr lang="fi-FI" sz="1400"/>
               <a:t>Channel</a:t>
             </a:r>
             <a:r>
               <a:rPr lang="fi-FI" sz="1400"/>
-              <a:t>の取扱いについて</a:t>
+              <a:t>形式のデータをグラフで表示します。</a:t>
             </a:r>
             <a:endParaRPr/>
           </a:p>
@@ -4213,7 +4302,7 @@
             </a:r>
             <a:r>
               <a:rPr lang="fi-FI" sz="1400"/>
-              <a:t>で扱う</a:t>
+              <a:t>にある</a:t>
             </a:r>
             <a:r>
               <a:rPr lang="fi-FI" sz="1400"/>
@@ -4221,23 +4310,15 @@
             </a:r>
             <a:r>
               <a:rPr lang="fi-FI" sz="1400"/>
-              <a:t>は、</a:t>
-            </a:r>
-            <a:r>
-              <a:rPr lang="fi-FI" sz="1400"/>
-              <a:t>Neuroshare</a:t>
-            </a:r>
-            <a:r>
-              <a:rPr lang="fi-FI" sz="1400"/>
-              <a:t>フォーマットの</a:t>
-            </a:r>
-            <a:r>
-              <a:rPr lang="fi-FI" sz="1400"/>
-              <a:t>Entity</a:t>
-            </a:r>
-            <a:r>
-              <a:rPr lang="fi-FI" sz="1400"/>
-              <a:t>に該当します。</a:t>
+              <a:t>を表示するため、事前に</a:t>
+            </a:r>
+            <a:r>
+              <a:rPr lang="fi-FI" sz="1400"/>
+              <a:t>Channel</a:t>
+            </a:r>
+            <a:r>
+              <a:rPr lang="fi-FI" sz="1400"/>
+              <a:t>を登録してください。</a:t>
             </a:r>
             <a:r>
               <a:rPr lang="fi-FI" sz="1400"/>
@@ -4246,11 +4327,23 @@
             </a:r>
             <a:r>
               <a:rPr lang="fi-FI" sz="1400"/>
-              <a:t>Channel Type</a:t>
-            </a:r>
-            <a:r>
-              <a:rPr lang="fi-FI" sz="1400"/>
-              <a:t>とその意味は以下の通りです。</a:t>
+              <a:t>(</a:t>
+            </a:r>
+            <a:r>
+              <a:rPr lang="fi-FI" sz="1400"/>
+              <a:t>登録方法は</a:t>
+            </a:r>
+            <a:r>
+              <a:rPr lang="fi-FI" sz="1400"/>
+              <a:t>Workspace</a:t>
+            </a:r>
+            <a:r>
+              <a:rPr lang="fi-FI" sz="1400"/>
+              <a:t>の項目を参照願います</a:t>
+            </a:r>
+            <a:r>
+              <a:rPr lang="fi-FI" sz="1400"/>
+              <a:t>)</a:t>
             </a:r>
             <a:endParaRPr/>
           </a:p>
@@ -4262,92 +4355,42 @@
             </a:pPr>
             <a:r>
               <a:rPr lang="fi-FI" sz="1400"/>
-              <a:t>Event : </a:t>
-            </a:r>
-            <a:r>
-              <a:rPr lang="fi-FI" sz="1400"/>
-              <a:t>時系列＋文字列のデータセット。ある時刻にとった状態を格納するのに使用する。</a:t>
-            </a:r>
-            <a:endParaRPr/>
-          </a:p>
-          <a:p>
-            <a:pPr lvl="1">
-              <a:buSzPct val="45000"/>
-              <a:buFont typeface="StarSymbol"/>
-              <a:buChar char=""/>
-            </a:pPr>
-            <a:r>
-              <a:rPr lang="fi-FI" sz="1400"/>
-              <a:t>Analog : </a:t>
-            </a:r>
-            <a:r>
-              <a:rPr lang="fi-FI" sz="1400"/>
-              <a:t>時系列＋</a:t>
-            </a:r>
-            <a:r>
-              <a:rPr lang="fi-FI" sz="1400"/>
-              <a:t>double</a:t>
-            </a:r>
-            <a:r>
-              <a:rPr lang="fi-FI" sz="1400"/>
-              <a:t>値のデータセット。時系列に沿って計測されたアナログ値を格納するのに使用する。</a:t>
-            </a:r>
-            <a:endParaRPr/>
-          </a:p>
-          <a:p>
-            <a:pPr lvl="1">
-              <a:buSzPct val="45000"/>
-              <a:buFont typeface="StarSymbol"/>
-              <a:buChar char=""/>
-            </a:pPr>
-            <a:r>
-              <a:rPr lang="fi-FI" sz="1400"/>
-              <a:t>Segment : </a:t>
-            </a:r>
-            <a:r>
-              <a:rPr lang="fi-FI" sz="1400"/>
-              <a:t>時系列＋</a:t>
-            </a:r>
-            <a:r>
-              <a:rPr lang="fi-FI" sz="1400"/>
-              <a:t>double</a:t>
-            </a:r>
-            <a:r>
-              <a:rPr lang="fi-FI" sz="1400"/>
-              <a:t>値＋</a:t>
-            </a:r>
-            <a:r>
-              <a:rPr lang="fi-FI" sz="1400"/>
-              <a:t>ID</a:t>
-            </a:r>
-            <a:r>
-              <a:rPr lang="fi-FI" sz="1400"/>
-              <a:t>のデータセット。アナログ値に</a:t>
-            </a:r>
-            <a:r>
-              <a:rPr lang="fi-FI" sz="1400"/>
-              <a:t>ID</a:t>
-            </a:r>
-            <a:r>
-              <a:rPr lang="fi-FI" sz="1400"/>
-              <a:t>番号を振った値を格納するのに使用する。</a:t>
-            </a:r>
-            <a:endParaRPr/>
-          </a:p>
-          <a:p>
-            <a:pPr lvl="1">
-              <a:buSzPct val="45000"/>
-              <a:buFont typeface="StarSymbol"/>
-              <a:buChar char=""/>
-            </a:pPr>
-            <a:r>
-              <a:rPr lang="fi-FI" sz="1400"/>
-              <a:t>NeuralEvent : </a:t>
-            </a:r>
-            <a:r>
-              <a:rPr lang="fi-FI" sz="1400"/>
-              <a:t>時系列のデータセット。スパイクデータの記述に使用する。</a:t>
-            </a:r>
+              <a:t>Workspace</a:t>
+            </a:r>
+            <a:r>
+              <a:rPr lang="fi-FI" sz="1400"/>
+              <a:t>に</a:t>
+            </a:r>
+            <a:r>
+              <a:rPr lang="fi-FI" sz="1400"/>
+              <a:t>Channel</a:t>
+            </a:r>
+            <a:r>
+              <a:rPr lang="fi-FI" sz="1400"/>
+              <a:t>を登録すると、</a:t>
+            </a:r>
+            <a:r>
+              <a:rPr lang="fi-FI" sz="1400"/>
+              <a:t>Analog</a:t>
+            </a:r>
+            <a:r>
+              <a:rPr lang="fi-FI" sz="1400"/>
+              <a:t>型の</a:t>
+            </a:r>
+            <a:r>
+              <a:rPr lang="fi-FI" sz="1400"/>
+              <a:t>Channel</a:t>
+            </a:r>
+            <a:r>
+              <a:rPr lang="fi-FI" sz="1400"/>
+              <a:t>のデータがグラフにプロットされます。</a:t>
+            </a:r>
+            <a:endParaRPr/>
+          </a:p>
+          <a:p>
+            <a:endParaRPr/>
+          </a:p>
+          <a:p>
             <a:endParaRPr/>
           </a:p>
         </p:txBody>
@@ -4376,7 +4419,240 @@
       </p:grpSpPr>
       <p:sp>
         <p:nvSpPr>
-          <p:cNvPr id="106" name="TextShape 1"/>
+          <p:cNvPr id="107" name="TextShape 1"/>
+          <p:cNvSpPr txBox="1"/>
+          <p:nvPr/>
+        </p:nvSpPr>
+        <p:spPr>
+          <a:xfrm>
+            <a:off x="468360" y="0"/>
+            <a:ext cx="9071640" cy="1262520"/>
+          </a:xfrm>
+          <a:prstGeom prst="rect">
+            <a:avLst/>
+          </a:prstGeom>
+        </p:spPr>
+        <p:txBody>
+          <a:bodyPr anchor="ctr" bIns="0" lIns="0" rIns="0" tIns="0" wrap="none"/>
+          <a:p>
+            <a:pPr algn="ctr"/>
+            <a:r>
+              <a:rPr lang="fi-FI" sz="2200"/>
+              <a:t>補足事項</a:t>
+            </a:r>
+            <a:endParaRPr/>
+          </a:p>
+        </p:txBody>
+      </p:sp>
+      <p:sp>
+        <p:nvSpPr>
+          <p:cNvPr id="108" name="TextShape 2"/>
+          <p:cNvSpPr txBox="1"/>
+          <p:nvPr/>
+        </p:nvSpPr>
+        <p:spPr>
+          <a:xfrm>
+            <a:off x="504000" y="1769040"/>
+            <a:ext cx="9071640" cy="4989600"/>
+          </a:xfrm>
+          <a:prstGeom prst="rect">
+            <a:avLst/>
+          </a:prstGeom>
+        </p:spPr>
+        <p:txBody>
+          <a:bodyPr bIns="0" lIns="0" rIns="0" tIns="0" wrap="none"/>
+          <a:p>
+            <a:pPr>
+              <a:buSzPct val="45000"/>
+              <a:buFont typeface="StarSymbol"/>
+              <a:buChar char=""/>
+            </a:pPr>
+            <a:r>
+              <a:rPr lang="fi-FI" sz="1400"/>
+              <a:t>Channel</a:t>
+            </a:r>
+            <a:r>
+              <a:rPr lang="fi-FI" sz="1400"/>
+              <a:t>の取扱いについて</a:t>
+            </a:r>
+            <a:endParaRPr/>
+          </a:p>
+          <a:p>
+            <a:pPr lvl="1">
+              <a:buSzPct val="45000"/>
+              <a:buFont typeface="StarSymbol"/>
+              <a:buChar char=""/>
+            </a:pPr>
+            <a:r>
+              <a:rPr lang="fi-FI" sz="1400"/>
+              <a:t>Workspace</a:t>
+            </a:r>
+            <a:r>
+              <a:rPr lang="fi-FI" sz="1400"/>
+              <a:t>で扱う</a:t>
+            </a:r>
+            <a:r>
+              <a:rPr lang="fi-FI" sz="1400"/>
+              <a:t>Channel</a:t>
+            </a:r>
+            <a:r>
+              <a:rPr lang="fi-FI" sz="1400"/>
+              <a:t>は、</a:t>
+            </a:r>
+            <a:r>
+              <a:rPr lang="fi-FI" sz="1400"/>
+              <a:t>Neuroshare</a:t>
+            </a:r>
+            <a:r>
+              <a:rPr lang="fi-FI" sz="1400"/>
+              <a:t>フォーマットの</a:t>
+            </a:r>
+            <a:r>
+              <a:rPr lang="fi-FI" sz="1400"/>
+              <a:t>Entity</a:t>
+            </a:r>
+            <a:r>
+              <a:rPr lang="fi-FI" sz="1400"/>
+              <a:t>に該当します。</a:t>
+            </a:r>
+            <a:r>
+              <a:rPr lang="fi-FI" sz="1400"/>
+              <a:t>
+</a:t>
+            </a:r>
+            <a:r>
+              <a:rPr lang="fi-FI" sz="1400"/>
+              <a:t>Channel Type</a:t>
+            </a:r>
+            <a:r>
+              <a:rPr lang="fi-FI" sz="1400"/>
+              <a:t>とその意味は以下の通りです。</a:t>
+            </a:r>
+            <a:endParaRPr/>
+          </a:p>
+          <a:p>
+            <a:pPr lvl="1">
+              <a:buSzPct val="45000"/>
+              <a:buFont typeface="StarSymbol"/>
+              <a:buChar char=""/>
+            </a:pPr>
+            <a:r>
+              <a:rPr lang="fi-FI" sz="1400"/>
+              <a:t>Event : </a:t>
+            </a:r>
+            <a:r>
+              <a:rPr lang="fi-FI" sz="1400"/>
+              <a:t>時系列＋文字列のデータセット。ある時刻にとった状態を格納するのに使用する。</a:t>
+            </a:r>
+            <a:endParaRPr/>
+          </a:p>
+          <a:p>
+            <a:pPr lvl="1">
+              <a:buSzPct val="45000"/>
+              <a:buFont typeface="StarSymbol"/>
+              <a:buChar char=""/>
+            </a:pPr>
+            <a:r>
+              <a:rPr lang="fi-FI" sz="1400"/>
+              <a:t>Analog : </a:t>
+            </a:r>
+            <a:r>
+              <a:rPr lang="fi-FI" sz="1400"/>
+              <a:t>時系列＋</a:t>
+            </a:r>
+            <a:r>
+              <a:rPr lang="fi-FI" sz="1400"/>
+              <a:t>double</a:t>
+            </a:r>
+            <a:r>
+              <a:rPr lang="fi-FI" sz="1400"/>
+              <a:t>値のデータセット。時系列に沿って計測されたアナログ値を格納するのに使用する。</a:t>
+            </a:r>
+            <a:endParaRPr/>
+          </a:p>
+          <a:p>
+            <a:pPr lvl="1">
+              <a:buSzPct val="45000"/>
+              <a:buFont typeface="StarSymbol"/>
+              <a:buChar char=""/>
+            </a:pPr>
+            <a:r>
+              <a:rPr lang="fi-FI" sz="1400"/>
+              <a:t>Segment : </a:t>
+            </a:r>
+            <a:r>
+              <a:rPr lang="fi-FI" sz="1400"/>
+              <a:t>時系列＋</a:t>
+            </a:r>
+            <a:r>
+              <a:rPr lang="fi-FI" sz="1400"/>
+              <a:t>double</a:t>
+            </a:r>
+            <a:r>
+              <a:rPr lang="fi-FI" sz="1400"/>
+              <a:t>値＋</a:t>
+            </a:r>
+            <a:r>
+              <a:rPr lang="fi-FI" sz="1400"/>
+              <a:t>ID</a:t>
+            </a:r>
+            <a:r>
+              <a:rPr lang="fi-FI" sz="1400"/>
+              <a:t>のデータセット。アナログ値に</a:t>
+            </a:r>
+            <a:r>
+              <a:rPr lang="fi-FI" sz="1400"/>
+              <a:t>ID</a:t>
+            </a:r>
+            <a:r>
+              <a:rPr lang="fi-FI" sz="1400"/>
+              <a:t>番号を振った値を格納するのに使用する。</a:t>
+            </a:r>
+            <a:endParaRPr/>
+          </a:p>
+          <a:p>
+            <a:pPr lvl="1">
+              <a:buSzPct val="45000"/>
+              <a:buFont typeface="StarSymbol"/>
+              <a:buChar char=""/>
+            </a:pPr>
+            <a:r>
+              <a:rPr lang="fi-FI" sz="1400"/>
+              <a:t>NeuralEvent : </a:t>
+            </a:r>
+            <a:r>
+              <a:rPr lang="fi-FI" sz="1400"/>
+              <a:t>時系列のデータセット。スパイクデータの記述に使用する。</a:t>
+            </a:r>
+            <a:endParaRPr/>
+          </a:p>
+        </p:txBody>
+      </p:sp>
+    </p:spTree>
+  </p:cSld>
+</p:sld>
+</file>
+
+<file path=ppt/slides/slide25.xml><?xml version="1.0" encoding="utf-8"?>
+<p:sld xmlns:a="http://schemas.openxmlformats.org/drawingml/2006/main" xmlns:p="http://schemas.openxmlformats.org/presentationml/2006/main" xmlns:r="http://schemas.openxmlformats.org/officeDocument/2006/relationships">
+  <p:cSld>
+    <p:spTree>
+      <p:nvGrpSpPr>
+        <p:cNvPr id="1" name=""/>
+        <p:cNvGrpSpPr/>
+        <p:nvPr/>
+      </p:nvGrpSpPr>
+      <p:grpSpPr>
+        <a:xfrm>
+          <a:off x="0" y="0"/>
+          <a:ext cx="0" cy="0"/>
+          <a:chOff x="0" y="0"/>
+          <a:chExt cx="0" cy="0"/>
+        </a:xfrm>
+      </p:grpSpPr>
+      <p:sp>
+        <p:nvSpPr>
+          <p:cNvPr id="109" name="TextShape 1"/>
           <p:cNvSpPr txBox="1"/>
           <p:nvPr/>
         </p:nvSpPr>
@@ -4403,7 +4679,7 @@
       </p:sp>
       <p:sp>
         <p:nvSpPr>
-          <p:cNvPr id="107" name="TextShape 2"/>
+          <p:cNvPr id="110" name="TextShape 2"/>
           <p:cNvSpPr txBox="1"/>
           <p:nvPr/>
         </p:nvSpPr>
@@ -4927,7 +5203,7 @@
             </a:r>
             <a:r>
               <a:rPr lang="fi-FI" sz="1400"/>
-              <a:t>(http://____)</a:t>
+              <a:t>(http://www.cns.atr.jp/dni/download/brainliner-desktop/)</a:t>
             </a:r>
             <a:r>
               <a:rPr lang="fi-FI" sz="1400"/>

</xml_diff>